<commit_message>
more updates on ppt
yeah :pizza:
</commit_message>
<xml_diff>
--- a/embedded C project .pptx
+++ b/embedded C project .pptx
@@ -9,13 +9,17 @@
     <p:sldId id="257" r:id="rId3"/>
     <p:sldId id="259" r:id="rId4"/>
     <p:sldId id="260" r:id="rId5"/>
-    <p:sldId id="264" r:id="rId6"/>
-    <p:sldId id="265" r:id="rId7"/>
-    <p:sldId id="266" r:id="rId8"/>
-    <p:sldId id="261" r:id="rId9"/>
-    <p:sldId id="262" r:id="rId10"/>
-    <p:sldId id="263" r:id="rId11"/>
-    <p:sldId id="258" r:id="rId12"/>
+    <p:sldId id="269" r:id="rId6"/>
+    <p:sldId id="264" r:id="rId7"/>
+    <p:sldId id="270" r:id="rId8"/>
+    <p:sldId id="265" r:id="rId9"/>
+    <p:sldId id="268" r:id="rId10"/>
+    <p:sldId id="266" r:id="rId11"/>
+    <p:sldId id="261" r:id="rId12"/>
+    <p:sldId id="262" r:id="rId13"/>
+    <p:sldId id="267" r:id="rId14"/>
+    <p:sldId id="258" r:id="rId15"/>
+    <p:sldId id="263" r:id="rId16"/>
   </p:sldIdLst>
   <p:sldSz cx="12192000" cy="6858000"/>
   <p:notesSz cx="6858000" cy="9144000"/>
@@ -5829,6 +5833,16 @@
           <a:lstStyle/>
           <a:p>
             <a:r>
+              <a:rPr lang="en-US" dirty="0" err="1"/>
+              <a:t>Cst</a:t>
+            </a:r>
+            <a:r>
+              <a:rPr lang="en-US" dirty="0"/>
+              <a:t> 120 </a:t>
+            </a:r>
+          </a:p>
+          <a:p>
+            <a:r>
               <a:rPr lang="en-US" dirty="0"/>
               <a:t>By: An c. and drew d.</a:t>
             </a:r>
@@ -5870,7 +5884,7 @@
           <p:cNvPr id="2" name="Title 1">
             <a:extLst>
               <a:ext uri="{FF2B5EF4-FFF2-40B4-BE49-F238E27FC236}">
-                <a16:creationId xmlns:a16="http://schemas.microsoft.com/office/drawing/2014/main" id="{0211EABF-91A9-4678-860F-6CA75B2CA051}"/>
+                <a16:creationId xmlns:a16="http://schemas.microsoft.com/office/drawing/2014/main" id="{E0649754-1368-4983-927C-2FB6D1909899}"/>
               </a:ext>
             </a:extLst>
           </p:cNvPr>
@@ -5888,7 +5902,15 @@
           <a:p>
             <a:r>
               <a:rPr lang="en-US" dirty="0"/>
-              <a:t>Questions? </a:t>
+              <a:t>Schematic for </a:t>
+            </a:r>
+            <a:r>
+              <a:rPr lang="en-US" dirty="0" err="1"/>
+              <a:t>atmega</a:t>
+            </a:r>
+            <a:r>
+              <a:rPr lang="en-US" dirty="0"/>
+              <a:t> 328p</a:t>
             </a:r>
           </a:p>
         </p:txBody>
@@ -5898,7 +5920,7 @@
           <p:cNvPr id="3" name="Content Placeholder 2">
             <a:extLst>
               <a:ext uri="{FF2B5EF4-FFF2-40B4-BE49-F238E27FC236}">
-                <a16:creationId xmlns:a16="http://schemas.microsoft.com/office/drawing/2014/main" id="{683B44CE-47EE-4FF6-B28D-97F4C5F855A5}"/>
+                <a16:creationId xmlns:a16="http://schemas.microsoft.com/office/drawing/2014/main" id="{E32DABB6-B9BD-46E6-8FF6-CAF4F177E0AA}"/>
               </a:ext>
             </a:extLst>
           </p:cNvPr>
@@ -5914,20 +5936,35 @@
           <a:bodyPr/>
           <a:lstStyle/>
           <a:p>
-            <a:endParaRPr lang="en-US"/>
+            <a:r>
+              <a:rPr lang="en-US" dirty="0"/>
+              <a:t>Will upload pic </a:t>
+            </a:r>
           </a:p>
         </p:txBody>
       </p:sp>
     </p:spTree>
     <p:extLst>
       <p:ext uri="{BB962C8B-B14F-4D97-AF65-F5344CB8AC3E}">
-        <p14:creationId xmlns:p14="http://schemas.microsoft.com/office/powerpoint/2010/main" val="2383072689"/>
+        <p14:creationId xmlns:p14="http://schemas.microsoft.com/office/powerpoint/2010/main" val="756373120"/>
       </p:ext>
     </p:extLst>
   </p:cSld>
   <p:clrMapOvr>
     <a:masterClrMapping/>
   </p:clrMapOvr>
+  <mc:AlternateContent xmlns:mc="http://schemas.openxmlformats.org/markup-compatibility/2006">
+    <mc:Choice xmlns:p15="http://schemas.microsoft.com/office/powerpoint/2012/main" Requires="p15">
+      <p:transition xmlns:p14="http://schemas.microsoft.com/office/powerpoint/2010/main" spd="slow" p14:dur="3250">
+        <p15:prstTrans prst="origami"/>
+      </p:transition>
+    </mc:Choice>
+    <mc:Fallback>
+      <p:transition spd="slow">
+        <p:fade/>
+      </p:transition>
+    </mc:Fallback>
+  </mc:AlternateContent>
 </p:sld>
 </file>
 
@@ -5953,6 +5990,1130 @@
           <p:cNvPr id="2" name="Title 1">
             <a:extLst>
               <a:ext uri="{FF2B5EF4-FFF2-40B4-BE49-F238E27FC236}">
+                <a16:creationId xmlns:a16="http://schemas.microsoft.com/office/drawing/2014/main" id="{F4091B77-3050-4CD5-9CB0-091C190E7B1B}"/>
+              </a:ext>
+            </a:extLst>
+          </p:cNvPr>
+          <p:cNvSpPr>
+            <a:spLocks noGrp="1"/>
+          </p:cNvSpPr>
+          <p:nvPr>
+            <p:ph type="title"/>
+          </p:nvPr>
+        </p:nvSpPr>
+        <p:spPr/>
+        <p:txBody>
+          <a:bodyPr/>
+          <a:lstStyle/>
+          <a:p>
+            <a:r>
+              <a:rPr lang="en-US" dirty="0"/>
+              <a:t>Frequency determination </a:t>
+            </a:r>
+          </a:p>
+        </p:txBody>
+      </p:sp>
+      <p:sp>
+        <p:nvSpPr>
+          <p:cNvPr id="3" name="Content Placeholder 2">
+            <a:extLst>
+              <a:ext uri="{FF2B5EF4-FFF2-40B4-BE49-F238E27FC236}">
+                <a16:creationId xmlns:a16="http://schemas.microsoft.com/office/drawing/2014/main" id="{D2D76396-8595-4CA1-88CD-AE56111DE7BA}"/>
+              </a:ext>
+            </a:extLst>
+          </p:cNvPr>
+          <p:cNvSpPr>
+            <a:spLocks noGrp="1"/>
+          </p:cNvSpPr>
+          <p:nvPr>
+            <p:ph idx="1"/>
+          </p:nvPr>
+        </p:nvSpPr>
+        <p:spPr/>
+        <p:txBody>
+          <a:bodyPr/>
+          <a:lstStyle/>
+          <a:p>
+            <a:r>
+              <a:rPr lang="en-US" dirty="0"/>
+              <a:t>Drew to explain </a:t>
+            </a:r>
+          </a:p>
+        </p:txBody>
+      </p:sp>
+    </p:spTree>
+    <p:extLst>
+      <p:ext uri="{BB962C8B-B14F-4D97-AF65-F5344CB8AC3E}">
+        <p14:creationId xmlns:p14="http://schemas.microsoft.com/office/powerpoint/2010/main" val="1152952955"/>
+      </p:ext>
+    </p:extLst>
+  </p:cSld>
+  <p:clrMapOvr>
+    <a:masterClrMapping/>
+  </p:clrMapOvr>
+  <mc:AlternateContent xmlns:mc="http://schemas.openxmlformats.org/markup-compatibility/2006">
+    <mc:Choice xmlns:p14="http://schemas.microsoft.com/office/powerpoint/2010/main" Requires="p14">
+      <p:transition spd="slow" p14:dur="2500">
+        <p:checker/>
+      </p:transition>
+    </mc:Choice>
+    <mc:Fallback>
+      <p:transition spd="slow">
+        <p:checker/>
+      </p:transition>
+    </mc:Fallback>
+  </mc:AlternateContent>
+</p:sld>
+</file>
+
+<file path=ppt/slides/slide12.xml><?xml version="1.0" encoding="utf-8"?>
+<p:sld xmlns:a="http://schemas.openxmlformats.org/drawingml/2006/main" xmlns:r="http://schemas.openxmlformats.org/officeDocument/2006/relationships" xmlns:p="http://schemas.openxmlformats.org/presentationml/2006/main">
+  <p:cSld>
+    <p:spTree>
+      <p:nvGrpSpPr>
+        <p:cNvPr id="1" name=""/>
+        <p:cNvGrpSpPr/>
+        <p:nvPr/>
+      </p:nvGrpSpPr>
+      <p:grpSpPr>
+        <a:xfrm>
+          <a:off x="0" y="0"/>
+          <a:ext cx="0" cy="0"/>
+          <a:chOff x="0" y="0"/>
+          <a:chExt cx="0" cy="0"/>
+        </a:xfrm>
+      </p:grpSpPr>
+      <p:sp>
+        <p:nvSpPr>
+          <p:cNvPr id="2" name="Title 1">
+            <a:extLst>
+              <a:ext uri="{FF2B5EF4-FFF2-40B4-BE49-F238E27FC236}">
+                <a16:creationId xmlns:a16="http://schemas.microsoft.com/office/drawing/2014/main" id="{A58B5A4A-4E11-4780-A6C3-2D57CB2B7FE1}"/>
+              </a:ext>
+            </a:extLst>
+          </p:cNvPr>
+          <p:cNvSpPr>
+            <a:spLocks noGrp="1"/>
+          </p:cNvSpPr>
+          <p:nvPr>
+            <p:ph type="title"/>
+          </p:nvPr>
+        </p:nvSpPr>
+        <p:spPr/>
+        <p:txBody>
+          <a:bodyPr/>
+          <a:lstStyle/>
+          <a:p>
+            <a:r>
+              <a:rPr lang="en-US" dirty="0"/>
+              <a:t>Software </a:t>
+            </a:r>
+          </a:p>
+        </p:txBody>
+      </p:sp>
+      <p:sp>
+        <p:nvSpPr>
+          <p:cNvPr id="3" name="Content Placeholder 2">
+            <a:extLst>
+              <a:ext uri="{FF2B5EF4-FFF2-40B4-BE49-F238E27FC236}">
+                <a16:creationId xmlns:a16="http://schemas.microsoft.com/office/drawing/2014/main" id="{28CDF226-AD79-4F2D-84C3-9B99D6B81B10}"/>
+              </a:ext>
+            </a:extLst>
+          </p:cNvPr>
+          <p:cNvSpPr>
+            <a:spLocks noGrp="1"/>
+          </p:cNvSpPr>
+          <p:nvPr>
+            <p:ph idx="1"/>
+          </p:nvPr>
+        </p:nvSpPr>
+        <p:spPr/>
+        <p:txBody>
+          <a:bodyPr/>
+          <a:lstStyle/>
+          <a:p>
+            <a:r>
+              <a:rPr lang="en-US" dirty="0"/>
+              <a:t>Included Adafruit_GFX and Adafruit_SSD1306 libraries to interface with OLED </a:t>
+            </a:r>
+          </a:p>
+          <a:p>
+            <a:r>
+              <a:rPr lang="en-US" dirty="0"/>
+              <a:t>Utilized the FFFT library for fast Fourier transformation </a:t>
+            </a:r>
+          </a:p>
+          <a:p>
+            <a:r>
+              <a:rPr lang="en-US" dirty="0"/>
+              <a:t>Utilized Arduino 8.5 IDE </a:t>
+            </a:r>
+          </a:p>
+          <a:p>
+            <a:r>
+              <a:rPr lang="en-US" dirty="0"/>
+              <a:t>Microcontroller reads in the levels of audio signals coming from the microphone at a 6KHz sample rate </a:t>
+            </a:r>
+          </a:p>
+          <a:p>
+            <a:r>
+              <a:rPr lang="en-US" dirty="0"/>
+              <a:t>A fast Fourier transformation is applied determining coefficient of each frequency range </a:t>
+            </a:r>
+          </a:p>
+          <a:p>
+            <a:r>
+              <a:rPr lang="en-US" dirty="0"/>
+              <a:t>Outputs largest coefficient in hertz </a:t>
+            </a:r>
+          </a:p>
+        </p:txBody>
+      </p:sp>
+    </p:spTree>
+    <p:extLst>
+      <p:ext uri="{BB962C8B-B14F-4D97-AF65-F5344CB8AC3E}">
+        <p14:creationId xmlns:p14="http://schemas.microsoft.com/office/powerpoint/2010/main" val="122623077"/>
+      </p:ext>
+    </p:extLst>
+  </p:cSld>
+  <p:clrMapOvr>
+    <a:masterClrMapping/>
+  </p:clrMapOvr>
+  <mc:AlternateContent xmlns:mc="http://schemas.openxmlformats.org/markup-compatibility/2006">
+    <mc:Choice xmlns:p14="http://schemas.microsoft.com/office/powerpoint/2010/main" Requires="p14">
+      <p:transition spd="slow" p14:dur="800">
+        <p14:flythrough/>
+      </p:transition>
+    </mc:Choice>
+    <mc:Fallback>
+      <p:transition spd="slow">
+        <p:fade/>
+      </p:transition>
+    </mc:Fallback>
+  </mc:AlternateContent>
+  <p:timing>
+    <p:tnLst>
+      <p:par>
+        <p:cTn id="1" dur="indefinite" restart="never" nodeType="tmRoot">
+          <p:childTnLst>
+            <p:seq concurrent="1" nextAc="seek">
+              <p:cTn id="2" dur="indefinite" nodeType="mainSeq">
+                <p:childTnLst>
+                  <p:par>
+                    <p:cTn id="3" fill="hold">
+                      <p:stCondLst>
+                        <p:cond delay="indefinite"/>
+                      </p:stCondLst>
+                      <p:childTnLst>
+                        <p:par>
+                          <p:cTn id="4" fill="hold">
+                            <p:stCondLst>
+                              <p:cond delay="0"/>
+                            </p:stCondLst>
+                            <p:childTnLst>
+                              <p:par>
+                                <p:cTn id="5" presetID="2" presetClass="entr" presetSubtype="4" fill="hold" nodeType="clickEffect">
+                                  <p:stCondLst>
+                                    <p:cond delay="0"/>
+                                  </p:stCondLst>
+                                  <p:childTnLst>
+                                    <p:set>
+                                      <p:cBhvr>
+                                        <p:cTn id="6" dur="1" fill="hold">
+                                          <p:stCondLst>
+                                            <p:cond delay="0"/>
+                                          </p:stCondLst>
+                                        </p:cTn>
+                                        <p:tgtEl>
+                                          <p:spTgt spid="3">
+                                            <p:txEl>
+                                              <p:pRg st="0" end="0"/>
+                                            </p:txEl>
+                                          </p:spTgt>
+                                        </p:tgtEl>
+                                        <p:attrNameLst>
+                                          <p:attrName>style.visibility</p:attrName>
+                                        </p:attrNameLst>
+                                      </p:cBhvr>
+                                      <p:to>
+                                        <p:strVal val="visible"/>
+                                      </p:to>
+                                    </p:set>
+                                    <p:anim calcmode="lin" valueType="num">
+                                      <p:cBhvr additive="base">
+                                        <p:cTn id="7" dur="500" fill="hold"/>
+                                        <p:tgtEl>
+                                          <p:spTgt spid="3">
+                                            <p:txEl>
+                                              <p:pRg st="0" end="0"/>
+                                            </p:txEl>
+                                          </p:spTgt>
+                                        </p:tgtEl>
+                                        <p:attrNameLst>
+                                          <p:attrName>ppt_x</p:attrName>
+                                        </p:attrNameLst>
+                                      </p:cBhvr>
+                                      <p:tavLst>
+                                        <p:tav tm="0">
+                                          <p:val>
+                                            <p:strVal val="#ppt_x"/>
+                                          </p:val>
+                                        </p:tav>
+                                        <p:tav tm="100000">
+                                          <p:val>
+                                            <p:strVal val="#ppt_x"/>
+                                          </p:val>
+                                        </p:tav>
+                                      </p:tavLst>
+                                    </p:anim>
+                                    <p:anim calcmode="lin" valueType="num">
+                                      <p:cBhvr additive="base">
+                                        <p:cTn id="8" dur="500" fill="hold"/>
+                                        <p:tgtEl>
+                                          <p:spTgt spid="3">
+                                            <p:txEl>
+                                              <p:pRg st="0" end="0"/>
+                                            </p:txEl>
+                                          </p:spTgt>
+                                        </p:tgtEl>
+                                        <p:attrNameLst>
+                                          <p:attrName>ppt_y</p:attrName>
+                                        </p:attrNameLst>
+                                      </p:cBhvr>
+                                      <p:tavLst>
+                                        <p:tav tm="0">
+                                          <p:val>
+                                            <p:strVal val="1+#ppt_h/2"/>
+                                          </p:val>
+                                        </p:tav>
+                                        <p:tav tm="100000">
+                                          <p:val>
+                                            <p:strVal val="#ppt_y"/>
+                                          </p:val>
+                                        </p:tav>
+                                      </p:tavLst>
+                                    </p:anim>
+                                  </p:childTnLst>
+                                </p:cTn>
+                              </p:par>
+                              <p:par>
+                                <p:cTn id="9" presetID="2" presetClass="entr" presetSubtype="4" fill="hold" nodeType="withEffect">
+                                  <p:stCondLst>
+                                    <p:cond delay="0"/>
+                                  </p:stCondLst>
+                                  <p:childTnLst>
+                                    <p:set>
+                                      <p:cBhvr>
+                                        <p:cTn id="10" dur="1" fill="hold">
+                                          <p:stCondLst>
+                                            <p:cond delay="0"/>
+                                          </p:stCondLst>
+                                        </p:cTn>
+                                        <p:tgtEl>
+                                          <p:spTgt spid="3">
+                                            <p:txEl>
+                                              <p:pRg st="1" end="1"/>
+                                            </p:txEl>
+                                          </p:spTgt>
+                                        </p:tgtEl>
+                                        <p:attrNameLst>
+                                          <p:attrName>style.visibility</p:attrName>
+                                        </p:attrNameLst>
+                                      </p:cBhvr>
+                                      <p:to>
+                                        <p:strVal val="visible"/>
+                                      </p:to>
+                                    </p:set>
+                                    <p:anim calcmode="lin" valueType="num">
+                                      <p:cBhvr additive="base">
+                                        <p:cTn id="11" dur="500" fill="hold"/>
+                                        <p:tgtEl>
+                                          <p:spTgt spid="3">
+                                            <p:txEl>
+                                              <p:pRg st="1" end="1"/>
+                                            </p:txEl>
+                                          </p:spTgt>
+                                        </p:tgtEl>
+                                        <p:attrNameLst>
+                                          <p:attrName>ppt_x</p:attrName>
+                                        </p:attrNameLst>
+                                      </p:cBhvr>
+                                      <p:tavLst>
+                                        <p:tav tm="0">
+                                          <p:val>
+                                            <p:strVal val="#ppt_x"/>
+                                          </p:val>
+                                        </p:tav>
+                                        <p:tav tm="100000">
+                                          <p:val>
+                                            <p:strVal val="#ppt_x"/>
+                                          </p:val>
+                                        </p:tav>
+                                      </p:tavLst>
+                                    </p:anim>
+                                    <p:anim calcmode="lin" valueType="num">
+                                      <p:cBhvr additive="base">
+                                        <p:cTn id="12" dur="500" fill="hold"/>
+                                        <p:tgtEl>
+                                          <p:spTgt spid="3">
+                                            <p:txEl>
+                                              <p:pRg st="1" end="1"/>
+                                            </p:txEl>
+                                          </p:spTgt>
+                                        </p:tgtEl>
+                                        <p:attrNameLst>
+                                          <p:attrName>ppt_y</p:attrName>
+                                        </p:attrNameLst>
+                                      </p:cBhvr>
+                                      <p:tavLst>
+                                        <p:tav tm="0">
+                                          <p:val>
+                                            <p:strVal val="1+#ppt_h/2"/>
+                                          </p:val>
+                                        </p:tav>
+                                        <p:tav tm="100000">
+                                          <p:val>
+                                            <p:strVal val="#ppt_y"/>
+                                          </p:val>
+                                        </p:tav>
+                                      </p:tavLst>
+                                    </p:anim>
+                                  </p:childTnLst>
+                                </p:cTn>
+                              </p:par>
+                              <p:par>
+                                <p:cTn id="13" presetID="2" presetClass="entr" presetSubtype="4" fill="hold" nodeType="withEffect">
+                                  <p:stCondLst>
+                                    <p:cond delay="0"/>
+                                  </p:stCondLst>
+                                  <p:childTnLst>
+                                    <p:set>
+                                      <p:cBhvr>
+                                        <p:cTn id="14" dur="1" fill="hold">
+                                          <p:stCondLst>
+                                            <p:cond delay="0"/>
+                                          </p:stCondLst>
+                                        </p:cTn>
+                                        <p:tgtEl>
+                                          <p:spTgt spid="3">
+                                            <p:txEl>
+                                              <p:pRg st="2" end="2"/>
+                                            </p:txEl>
+                                          </p:spTgt>
+                                        </p:tgtEl>
+                                        <p:attrNameLst>
+                                          <p:attrName>style.visibility</p:attrName>
+                                        </p:attrNameLst>
+                                      </p:cBhvr>
+                                      <p:to>
+                                        <p:strVal val="visible"/>
+                                      </p:to>
+                                    </p:set>
+                                    <p:anim calcmode="lin" valueType="num">
+                                      <p:cBhvr additive="base">
+                                        <p:cTn id="15" dur="500" fill="hold"/>
+                                        <p:tgtEl>
+                                          <p:spTgt spid="3">
+                                            <p:txEl>
+                                              <p:pRg st="2" end="2"/>
+                                            </p:txEl>
+                                          </p:spTgt>
+                                        </p:tgtEl>
+                                        <p:attrNameLst>
+                                          <p:attrName>ppt_x</p:attrName>
+                                        </p:attrNameLst>
+                                      </p:cBhvr>
+                                      <p:tavLst>
+                                        <p:tav tm="0">
+                                          <p:val>
+                                            <p:strVal val="#ppt_x"/>
+                                          </p:val>
+                                        </p:tav>
+                                        <p:tav tm="100000">
+                                          <p:val>
+                                            <p:strVal val="#ppt_x"/>
+                                          </p:val>
+                                        </p:tav>
+                                      </p:tavLst>
+                                    </p:anim>
+                                    <p:anim calcmode="lin" valueType="num">
+                                      <p:cBhvr additive="base">
+                                        <p:cTn id="16" dur="500" fill="hold"/>
+                                        <p:tgtEl>
+                                          <p:spTgt spid="3">
+                                            <p:txEl>
+                                              <p:pRg st="2" end="2"/>
+                                            </p:txEl>
+                                          </p:spTgt>
+                                        </p:tgtEl>
+                                        <p:attrNameLst>
+                                          <p:attrName>ppt_y</p:attrName>
+                                        </p:attrNameLst>
+                                      </p:cBhvr>
+                                      <p:tavLst>
+                                        <p:tav tm="0">
+                                          <p:val>
+                                            <p:strVal val="1+#ppt_h/2"/>
+                                          </p:val>
+                                        </p:tav>
+                                        <p:tav tm="100000">
+                                          <p:val>
+                                            <p:strVal val="#ppt_y"/>
+                                          </p:val>
+                                        </p:tav>
+                                      </p:tavLst>
+                                    </p:anim>
+                                  </p:childTnLst>
+                                </p:cTn>
+                              </p:par>
+                              <p:par>
+                                <p:cTn id="17" presetID="2" presetClass="entr" presetSubtype="4" fill="hold" nodeType="withEffect">
+                                  <p:stCondLst>
+                                    <p:cond delay="0"/>
+                                  </p:stCondLst>
+                                  <p:childTnLst>
+                                    <p:set>
+                                      <p:cBhvr>
+                                        <p:cTn id="18" dur="1" fill="hold">
+                                          <p:stCondLst>
+                                            <p:cond delay="0"/>
+                                          </p:stCondLst>
+                                        </p:cTn>
+                                        <p:tgtEl>
+                                          <p:spTgt spid="3">
+                                            <p:txEl>
+                                              <p:pRg st="3" end="3"/>
+                                            </p:txEl>
+                                          </p:spTgt>
+                                        </p:tgtEl>
+                                        <p:attrNameLst>
+                                          <p:attrName>style.visibility</p:attrName>
+                                        </p:attrNameLst>
+                                      </p:cBhvr>
+                                      <p:to>
+                                        <p:strVal val="visible"/>
+                                      </p:to>
+                                    </p:set>
+                                    <p:anim calcmode="lin" valueType="num">
+                                      <p:cBhvr additive="base">
+                                        <p:cTn id="19" dur="500" fill="hold"/>
+                                        <p:tgtEl>
+                                          <p:spTgt spid="3">
+                                            <p:txEl>
+                                              <p:pRg st="3" end="3"/>
+                                            </p:txEl>
+                                          </p:spTgt>
+                                        </p:tgtEl>
+                                        <p:attrNameLst>
+                                          <p:attrName>ppt_x</p:attrName>
+                                        </p:attrNameLst>
+                                      </p:cBhvr>
+                                      <p:tavLst>
+                                        <p:tav tm="0">
+                                          <p:val>
+                                            <p:strVal val="#ppt_x"/>
+                                          </p:val>
+                                        </p:tav>
+                                        <p:tav tm="100000">
+                                          <p:val>
+                                            <p:strVal val="#ppt_x"/>
+                                          </p:val>
+                                        </p:tav>
+                                      </p:tavLst>
+                                    </p:anim>
+                                    <p:anim calcmode="lin" valueType="num">
+                                      <p:cBhvr additive="base">
+                                        <p:cTn id="20" dur="500" fill="hold"/>
+                                        <p:tgtEl>
+                                          <p:spTgt spid="3">
+                                            <p:txEl>
+                                              <p:pRg st="3" end="3"/>
+                                            </p:txEl>
+                                          </p:spTgt>
+                                        </p:tgtEl>
+                                        <p:attrNameLst>
+                                          <p:attrName>ppt_y</p:attrName>
+                                        </p:attrNameLst>
+                                      </p:cBhvr>
+                                      <p:tavLst>
+                                        <p:tav tm="0">
+                                          <p:val>
+                                            <p:strVal val="1+#ppt_h/2"/>
+                                          </p:val>
+                                        </p:tav>
+                                        <p:tav tm="100000">
+                                          <p:val>
+                                            <p:strVal val="#ppt_y"/>
+                                          </p:val>
+                                        </p:tav>
+                                      </p:tavLst>
+                                    </p:anim>
+                                  </p:childTnLst>
+                                </p:cTn>
+                              </p:par>
+                              <p:par>
+                                <p:cTn id="21" presetID="2" presetClass="entr" presetSubtype="4" fill="hold" nodeType="withEffect">
+                                  <p:stCondLst>
+                                    <p:cond delay="0"/>
+                                  </p:stCondLst>
+                                  <p:childTnLst>
+                                    <p:set>
+                                      <p:cBhvr>
+                                        <p:cTn id="22" dur="1" fill="hold">
+                                          <p:stCondLst>
+                                            <p:cond delay="0"/>
+                                          </p:stCondLst>
+                                        </p:cTn>
+                                        <p:tgtEl>
+                                          <p:spTgt spid="3">
+                                            <p:txEl>
+                                              <p:pRg st="4" end="4"/>
+                                            </p:txEl>
+                                          </p:spTgt>
+                                        </p:tgtEl>
+                                        <p:attrNameLst>
+                                          <p:attrName>style.visibility</p:attrName>
+                                        </p:attrNameLst>
+                                      </p:cBhvr>
+                                      <p:to>
+                                        <p:strVal val="visible"/>
+                                      </p:to>
+                                    </p:set>
+                                    <p:anim calcmode="lin" valueType="num">
+                                      <p:cBhvr additive="base">
+                                        <p:cTn id="23" dur="500" fill="hold"/>
+                                        <p:tgtEl>
+                                          <p:spTgt spid="3">
+                                            <p:txEl>
+                                              <p:pRg st="4" end="4"/>
+                                            </p:txEl>
+                                          </p:spTgt>
+                                        </p:tgtEl>
+                                        <p:attrNameLst>
+                                          <p:attrName>ppt_x</p:attrName>
+                                        </p:attrNameLst>
+                                      </p:cBhvr>
+                                      <p:tavLst>
+                                        <p:tav tm="0">
+                                          <p:val>
+                                            <p:strVal val="#ppt_x"/>
+                                          </p:val>
+                                        </p:tav>
+                                        <p:tav tm="100000">
+                                          <p:val>
+                                            <p:strVal val="#ppt_x"/>
+                                          </p:val>
+                                        </p:tav>
+                                      </p:tavLst>
+                                    </p:anim>
+                                    <p:anim calcmode="lin" valueType="num">
+                                      <p:cBhvr additive="base">
+                                        <p:cTn id="24" dur="500" fill="hold"/>
+                                        <p:tgtEl>
+                                          <p:spTgt spid="3">
+                                            <p:txEl>
+                                              <p:pRg st="4" end="4"/>
+                                            </p:txEl>
+                                          </p:spTgt>
+                                        </p:tgtEl>
+                                        <p:attrNameLst>
+                                          <p:attrName>ppt_y</p:attrName>
+                                        </p:attrNameLst>
+                                      </p:cBhvr>
+                                      <p:tavLst>
+                                        <p:tav tm="0">
+                                          <p:val>
+                                            <p:strVal val="1+#ppt_h/2"/>
+                                          </p:val>
+                                        </p:tav>
+                                        <p:tav tm="100000">
+                                          <p:val>
+                                            <p:strVal val="#ppt_y"/>
+                                          </p:val>
+                                        </p:tav>
+                                      </p:tavLst>
+                                    </p:anim>
+                                  </p:childTnLst>
+                                </p:cTn>
+                              </p:par>
+                              <p:par>
+                                <p:cTn id="25" presetID="2" presetClass="entr" presetSubtype="4" fill="hold" nodeType="withEffect">
+                                  <p:stCondLst>
+                                    <p:cond delay="0"/>
+                                  </p:stCondLst>
+                                  <p:childTnLst>
+                                    <p:set>
+                                      <p:cBhvr>
+                                        <p:cTn id="26" dur="1" fill="hold">
+                                          <p:stCondLst>
+                                            <p:cond delay="0"/>
+                                          </p:stCondLst>
+                                        </p:cTn>
+                                        <p:tgtEl>
+                                          <p:spTgt spid="3">
+                                            <p:txEl>
+                                              <p:pRg st="5" end="5"/>
+                                            </p:txEl>
+                                          </p:spTgt>
+                                        </p:tgtEl>
+                                        <p:attrNameLst>
+                                          <p:attrName>style.visibility</p:attrName>
+                                        </p:attrNameLst>
+                                      </p:cBhvr>
+                                      <p:to>
+                                        <p:strVal val="visible"/>
+                                      </p:to>
+                                    </p:set>
+                                    <p:anim calcmode="lin" valueType="num">
+                                      <p:cBhvr additive="base">
+                                        <p:cTn id="27" dur="500" fill="hold"/>
+                                        <p:tgtEl>
+                                          <p:spTgt spid="3">
+                                            <p:txEl>
+                                              <p:pRg st="5" end="5"/>
+                                            </p:txEl>
+                                          </p:spTgt>
+                                        </p:tgtEl>
+                                        <p:attrNameLst>
+                                          <p:attrName>ppt_x</p:attrName>
+                                        </p:attrNameLst>
+                                      </p:cBhvr>
+                                      <p:tavLst>
+                                        <p:tav tm="0">
+                                          <p:val>
+                                            <p:strVal val="#ppt_x"/>
+                                          </p:val>
+                                        </p:tav>
+                                        <p:tav tm="100000">
+                                          <p:val>
+                                            <p:strVal val="#ppt_x"/>
+                                          </p:val>
+                                        </p:tav>
+                                      </p:tavLst>
+                                    </p:anim>
+                                    <p:anim calcmode="lin" valueType="num">
+                                      <p:cBhvr additive="base">
+                                        <p:cTn id="28" dur="500" fill="hold"/>
+                                        <p:tgtEl>
+                                          <p:spTgt spid="3">
+                                            <p:txEl>
+                                              <p:pRg st="5" end="5"/>
+                                            </p:txEl>
+                                          </p:spTgt>
+                                        </p:tgtEl>
+                                        <p:attrNameLst>
+                                          <p:attrName>ppt_y</p:attrName>
+                                        </p:attrNameLst>
+                                      </p:cBhvr>
+                                      <p:tavLst>
+                                        <p:tav tm="0">
+                                          <p:val>
+                                            <p:strVal val="1+#ppt_h/2"/>
+                                          </p:val>
+                                        </p:tav>
+                                        <p:tav tm="100000">
+                                          <p:val>
+                                            <p:strVal val="#ppt_y"/>
+                                          </p:val>
+                                        </p:tav>
+                                      </p:tavLst>
+                                    </p:anim>
+                                  </p:childTnLst>
+                                </p:cTn>
+                              </p:par>
+                            </p:childTnLst>
+                          </p:cTn>
+                        </p:par>
+                      </p:childTnLst>
+                    </p:cTn>
+                  </p:par>
+                </p:childTnLst>
+              </p:cTn>
+              <p:prevCondLst>
+                <p:cond evt="onPrev" delay="0">
+                  <p:tgtEl>
+                    <p:sldTgt/>
+                  </p:tgtEl>
+                </p:cond>
+              </p:prevCondLst>
+              <p:nextCondLst>
+                <p:cond evt="onNext" delay="0">
+                  <p:tgtEl>
+                    <p:sldTgt/>
+                  </p:tgtEl>
+                </p:cond>
+              </p:nextCondLst>
+            </p:seq>
+          </p:childTnLst>
+        </p:cTn>
+      </p:par>
+    </p:tnLst>
+  </p:timing>
+</p:sld>
+</file>
+
+<file path=ppt/slides/slide13.xml><?xml version="1.0" encoding="utf-8"?>
+<p:sld xmlns:a="http://schemas.openxmlformats.org/drawingml/2006/main" xmlns:r="http://schemas.openxmlformats.org/officeDocument/2006/relationships" xmlns:p="http://schemas.openxmlformats.org/presentationml/2006/main">
+  <p:cSld>
+    <p:spTree>
+      <p:nvGrpSpPr>
+        <p:cNvPr id="1" name=""/>
+        <p:cNvGrpSpPr/>
+        <p:nvPr/>
+      </p:nvGrpSpPr>
+      <p:grpSpPr>
+        <a:xfrm>
+          <a:off x="0" y="0"/>
+          <a:ext cx="0" cy="0"/>
+          <a:chOff x="0" y="0"/>
+          <a:chExt cx="0" cy="0"/>
+        </a:xfrm>
+      </p:grpSpPr>
+      <p:sp>
+        <p:nvSpPr>
+          <p:cNvPr id="2" name="Title 1">
+            <a:extLst>
+              <a:ext uri="{FF2B5EF4-FFF2-40B4-BE49-F238E27FC236}">
+                <a16:creationId xmlns:a16="http://schemas.microsoft.com/office/drawing/2014/main" id="{AC2488E9-6222-477E-9187-621932006C88}"/>
+              </a:ext>
+            </a:extLst>
+          </p:cNvPr>
+          <p:cNvSpPr>
+            <a:spLocks noGrp="1"/>
+          </p:cNvSpPr>
+          <p:nvPr>
+            <p:ph type="title"/>
+          </p:nvPr>
+        </p:nvSpPr>
+        <p:spPr/>
+        <p:txBody>
+          <a:bodyPr/>
+          <a:lstStyle/>
+          <a:p>
+            <a:r>
+              <a:rPr lang="en-US" dirty="0"/>
+              <a:t>Possible improvements		</a:t>
+            </a:r>
+          </a:p>
+        </p:txBody>
+      </p:sp>
+      <p:sp>
+        <p:nvSpPr>
+          <p:cNvPr id="3" name="Content Placeholder 2">
+            <a:extLst>
+              <a:ext uri="{FF2B5EF4-FFF2-40B4-BE49-F238E27FC236}">
+                <a16:creationId xmlns:a16="http://schemas.microsoft.com/office/drawing/2014/main" id="{36DF851A-0612-4BDF-9FE6-620837F3B0DC}"/>
+              </a:ext>
+            </a:extLst>
+          </p:cNvPr>
+          <p:cNvSpPr>
+            <a:spLocks noGrp="1"/>
+          </p:cNvSpPr>
+          <p:nvPr>
+            <p:ph idx="1"/>
+          </p:nvPr>
+        </p:nvSpPr>
+        <p:spPr/>
+        <p:txBody>
+          <a:bodyPr/>
+          <a:lstStyle/>
+          <a:p>
+            <a:r>
+              <a:rPr lang="en-US" dirty="0"/>
+              <a:t>Could add a dedicated ADC to get higher bit rate for more accurate conversion </a:t>
+            </a:r>
+          </a:p>
+          <a:p>
+            <a:r>
+              <a:rPr lang="en-US" dirty="0"/>
+              <a:t>Could add hardware high and low pass filters to remove unwanted noise </a:t>
+            </a:r>
+          </a:p>
+        </p:txBody>
+      </p:sp>
+    </p:spTree>
+    <p:extLst>
+      <p:ext uri="{BB962C8B-B14F-4D97-AF65-F5344CB8AC3E}">
+        <p14:creationId xmlns:p14="http://schemas.microsoft.com/office/powerpoint/2010/main" val="3513082253"/>
+      </p:ext>
+    </p:extLst>
+  </p:cSld>
+  <p:clrMapOvr>
+    <a:masterClrMapping/>
+  </p:clrMapOvr>
+  <mc:AlternateContent xmlns:mc="http://schemas.openxmlformats.org/markup-compatibility/2006">
+    <mc:Choice xmlns:p14="http://schemas.microsoft.com/office/powerpoint/2010/main" Requires="p14">
+      <p:transition spd="slow" p14:dur="1600">
+        <p14:prism isContent="1" isInverted="1"/>
+      </p:transition>
+    </mc:Choice>
+    <mc:Fallback>
+      <p:transition spd="slow">
+        <p:fade/>
+      </p:transition>
+    </mc:Fallback>
+  </mc:AlternateContent>
+  <p:timing>
+    <p:tnLst>
+      <p:par>
+        <p:cTn id="1" dur="indefinite" restart="never" nodeType="tmRoot">
+          <p:childTnLst>
+            <p:seq concurrent="1" nextAc="seek">
+              <p:cTn id="2" dur="indefinite" nodeType="mainSeq">
+                <p:childTnLst>
+                  <p:par>
+                    <p:cTn id="3" fill="hold">
+                      <p:stCondLst>
+                        <p:cond delay="indefinite"/>
+                      </p:stCondLst>
+                      <p:childTnLst>
+                        <p:par>
+                          <p:cTn id="4" fill="hold">
+                            <p:stCondLst>
+                              <p:cond delay="0"/>
+                            </p:stCondLst>
+                            <p:childTnLst>
+                              <p:par>
+                                <p:cTn id="5" presetID="2" presetClass="entr" presetSubtype="4" fill="hold" nodeType="clickEffect">
+                                  <p:stCondLst>
+                                    <p:cond delay="0"/>
+                                  </p:stCondLst>
+                                  <p:childTnLst>
+                                    <p:set>
+                                      <p:cBhvr>
+                                        <p:cTn id="6" dur="1" fill="hold">
+                                          <p:stCondLst>
+                                            <p:cond delay="0"/>
+                                          </p:stCondLst>
+                                        </p:cTn>
+                                        <p:tgtEl>
+                                          <p:spTgt spid="3">
+                                            <p:txEl>
+                                              <p:pRg st="0" end="0"/>
+                                            </p:txEl>
+                                          </p:spTgt>
+                                        </p:tgtEl>
+                                        <p:attrNameLst>
+                                          <p:attrName>style.visibility</p:attrName>
+                                        </p:attrNameLst>
+                                      </p:cBhvr>
+                                      <p:to>
+                                        <p:strVal val="visible"/>
+                                      </p:to>
+                                    </p:set>
+                                    <p:anim calcmode="lin" valueType="num">
+                                      <p:cBhvr additive="base">
+                                        <p:cTn id="7" dur="500" fill="hold"/>
+                                        <p:tgtEl>
+                                          <p:spTgt spid="3">
+                                            <p:txEl>
+                                              <p:pRg st="0" end="0"/>
+                                            </p:txEl>
+                                          </p:spTgt>
+                                        </p:tgtEl>
+                                        <p:attrNameLst>
+                                          <p:attrName>ppt_x</p:attrName>
+                                        </p:attrNameLst>
+                                      </p:cBhvr>
+                                      <p:tavLst>
+                                        <p:tav tm="0">
+                                          <p:val>
+                                            <p:strVal val="#ppt_x"/>
+                                          </p:val>
+                                        </p:tav>
+                                        <p:tav tm="100000">
+                                          <p:val>
+                                            <p:strVal val="#ppt_x"/>
+                                          </p:val>
+                                        </p:tav>
+                                      </p:tavLst>
+                                    </p:anim>
+                                    <p:anim calcmode="lin" valueType="num">
+                                      <p:cBhvr additive="base">
+                                        <p:cTn id="8" dur="500" fill="hold"/>
+                                        <p:tgtEl>
+                                          <p:spTgt spid="3">
+                                            <p:txEl>
+                                              <p:pRg st="0" end="0"/>
+                                            </p:txEl>
+                                          </p:spTgt>
+                                        </p:tgtEl>
+                                        <p:attrNameLst>
+                                          <p:attrName>ppt_y</p:attrName>
+                                        </p:attrNameLst>
+                                      </p:cBhvr>
+                                      <p:tavLst>
+                                        <p:tav tm="0">
+                                          <p:val>
+                                            <p:strVal val="1+#ppt_h/2"/>
+                                          </p:val>
+                                        </p:tav>
+                                        <p:tav tm="100000">
+                                          <p:val>
+                                            <p:strVal val="#ppt_y"/>
+                                          </p:val>
+                                        </p:tav>
+                                      </p:tavLst>
+                                    </p:anim>
+                                  </p:childTnLst>
+                                </p:cTn>
+                              </p:par>
+                            </p:childTnLst>
+                          </p:cTn>
+                        </p:par>
+                      </p:childTnLst>
+                    </p:cTn>
+                  </p:par>
+                  <p:par>
+                    <p:cTn id="9" fill="hold">
+                      <p:stCondLst>
+                        <p:cond delay="indefinite"/>
+                      </p:stCondLst>
+                      <p:childTnLst>
+                        <p:par>
+                          <p:cTn id="10" fill="hold">
+                            <p:stCondLst>
+                              <p:cond delay="0"/>
+                            </p:stCondLst>
+                            <p:childTnLst>
+                              <p:par>
+                                <p:cTn id="11" presetID="2" presetClass="entr" presetSubtype="4" fill="hold" nodeType="clickEffect">
+                                  <p:stCondLst>
+                                    <p:cond delay="0"/>
+                                  </p:stCondLst>
+                                  <p:childTnLst>
+                                    <p:set>
+                                      <p:cBhvr>
+                                        <p:cTn id="12" dur="1" fill="hold">
+                                          <p:stCondLst>
+                                            <p:cond delay="0"/>
+                                          </p:stCondLst>
+                                        </p:cTn>
+                                        <p:tgtEl>
+                                          <p:spTgt spid="3">
+                                            <p:txEl>
+                                              <p:pRg st="1" end="1"/>
+                                            </p:txEl>
+                                          </p:spTgt>
+                                        </p:tgtEl>
+                                        <p:attrNameLst>
+                                          <p:attrName>style.visibility</p:attrName>
+                                        </p:attrNameLst>
+                                      </p:cBhvr>
+                                      <p:to>
+                                        <p:strVal val="visible"/>
+                                      </p:to>
+                                    </p:set>
+                                    <p:anim calcmode="lin" valueType="num">
+                                      <p:cBhvr additive="base">
+                                        <p:cTn id="13" dur="500" fill="hold"/>
+                                        <p:tgtEl>
+                                          <p:spTgt spid="3">
+                                            <p:txEl>
+                                              <p:pRg st="1" end="1"/>
+                                            </p:txEl>
+                                          </p:spTgt>
+                                        </p:tgtEl>
+                                        <p:attrNameLst>
+                                          <p:attrName>ppt_x</p:attrName>
+                                        </p:attrNameLst>
+                                      </p:cBhvr>
+                                      <p:tavLst>
+                                        <p:tav tm="0">
+                                          <p:val>
+                                            <p:strVal val="#ppt_x"/>
+                                          </p:val>
+                                        </p:tav>
+                                        <p:tav tm="100000">
+                                          <p:val>
+                                            <p:strVal val="#ppt_x"/>
+                                          </p:val>
+                                        </p:tav>
+                                      </p:tavLst>
+                                    </p:anim>
+                                    <p:anim calcmode="lin" valueType="num">
+                                      <p:cBhvr additive="base">
+                                        <p:cTn id="14" dur="500" fill="hold"/>
+                                        <p:tgtEl>
+                                          <p:spTgt spid="3">
+                                            <p:txEl>
+                                              <p:pRg st="1" end="1"/>
+                                            </p:txEl>
+                                          </p:spTgt>
+                                        </p:tgtEl>
+                                        <p:attrNameLst>
+                                          <p:attrName>ppt_y</p:attrName>
+                                        </p:attrNameLst>
+                                      </p:cBhvr>
+                                      <p:tavLst>
+                                        <p:tav tm="0">
+                                          <p:val>
+                                            <p:strVal val="1+#ppt_h/2"/>
+                                          </p:val>
+                                        </p:tav>
+                                        <p:tav tm="100000">
+                                          <p:val>
+                                            <p:strVal val="#ppt_y"/>
+                                          </p:val>
+                                        </p:tav>
+                                      </p:tavLst>
+                                    </p:anim>
+                                  </p:childTnLst>
+                                </p:cTn>
+                              </p:par>
+                            </p:childTnLst>
+                          </p:cTn>
+                        </p:par>
+                      </p:childTnLst>
+                    </p:cTn>
+                  </p:par>
+                </p:childTnLst>
+              </p:cTn>
+              <p:prevCondLst>
+                <p:cond evt="onPrev" delay="0">
+                  <p:tgtEl>
+                    <p:sldTgt/>
+                  </p:tgtEl>
+                </p:cond>
+              </p:prevCondLst>
+              <p:nextCondLst>
+                <p:cond evt="onNext" delay="0">
+                  <p:tgtEl>
+                    <p:sldTgt/>
+                  </p:tgtEl>
+                </p:cond>
+              </p:nextCondLst>
+            </p:seq>
+          </p:childTnLst>
+        </p:cTn>
+      </p:par>
+    </p:tnLst>
+  </p:timing>
+</p:sld>
+</file>
+
+<file path=ppt/slides/slide14.xml><?xml version="1.0" encoding="utf-8"?>
+<p:sld xmlns:a="http://schemas.openxmlformats.org/drawingml/2006/main" xmlns:r="http://schemas.openxmlformats.org/officeDocument/2006/relationships" xmlns:p="http://schemas.openxmlformats.org/presentationml/2006/main">
+  <p:cSld>
+    <p:spTree>
+      <p:nvGrpSpPr>
+        <p:cNvPr id="1" name=""/>
+        <p:cNvGrpSpPr/>
+        <p:nvPr/>
+      </p:nvGrpSpPr>
+      <p:grpSpPr>
+        <a:xfrm>
+          <a:off x="0" y="0"/>
+          <a:ext cx="0" cy="0"/>
+          <a:chOff x="0" y="0"/>
+          <a:chExt cx="0" cy="0"/>
+        </a:xfrm>
+      </p:grpSpPr>
+      <p:sp>
+        <p:nvSpPr>
+          <p:cNvPr id="2" name="Title 1">
+            <a:extLst>
+              <a:ext uri="{FF2B5EF4-FFF2-40B4-BE49-F238E27FC236}">
                 <a16:creationId xmlns:a16="http://schemas.microsoft.com/office/drawing/2014/main" id="{0BB23F91-E335-43F5-9EA3-176ED7C70901}"/>
               </a:ext>
             </a:extLst>
@@ -5964,43 +7125,53 @@
             <p:ph type="title"/>
           </p:nvPr>
         </p:nvSpPr>
-        <p:spPr/>
+        <p:spPr>
+          <a:xfrm>
+            <a:off x="685801" y="609600"/>
+            <a:ext cx="10131425" cy="1456267"/>
+          </a:xfrm>
+        </p:spPr>
         <p:txBody>
           <a:bodyPr/>
           <a:lstStyle/>
           <a:p>
-            <a:r>
-              <a:rPr lang="en-US" dirty="0"/>
+            <a:pPr algn="ctr"/>
+            <a:r>
+              <a:rPr lang="en-US" b="1" dirty="0"/>
               <a:t>DEMO </a:t>
             </a:r>
           </a:p>
         </p:txBody>
       </p:sp>
-      <p:sp>
-        <p:nvSpPr>
-          <p:cNvPr id="3" name="Content Placeholder 2">
+      <p:pic>
+        <p:nvPicPr>
+          <p:cNvPr id="5" name="Content Placeholder 4" descr="A picture containing indoor, table, sitting, wall&#10;&#10;Description generated with very high confidence">
             <a:extLst>
               <a:ext uri="{FF2B5EF4-FFF2-40B4-BE49-F238E27FC236}">
-                <a16:creationId xmlns:a16="http://schemas.microsoft.com/office/drawing/2014/main" id="{E0FD35AC-5797-4FD2-AB8C-57A2B5CE1876}"/>
+                <a16:creationId xmlns:a16="http://schemas.microsoft.com/office/drawing/2014/main" id="{D6E529A7-4D65-405F-B562-BD70D9049827}"/>
               </a:ext>
             </a:extLst>
           </p:cNvPr>
-          <p:cNvSpPr>
-            <a:spLocks noGrp="1"/>
-          </p:cNvSpPr>
+          <p:cNvPicPr>
+            <a:picLocks noGrp="1" noChangeAspect="1"/>
+          </p:cNvPicPr>
           <p:nvPr>
             <p:ph idx="1"/>
           </p:nvPr>
-        </p:nvSpPr>
-        <p:spPr/>
-        <p:txBody>
-          <a:bodyPr/>
-          <a:lstStyle/>
-          <a:p>
-            <a:endParaRPr lang="en-US"/>
-          </a:p>
-        </p:txBody>
-      </p:sp>
+        </p:nvPicPr>
+        <p:blipFill>
+          <a:blip r:embed="rId2"/>
+          <a:stretch>
+            <a:fillRect/>
+          </a:stretch>
+        </p:blipFill>
+        <p:spPr>
+          <a:xfrm>
+            <a:off x="2507368" y="2141538"/>
+            <a:ext cx="6488288" cy="3649662"/>
+          </a:xfrm>
+        </p:spPr>
+      </p:pic>
     </p:spTree>
     <p:extLst>
       <p:ext uri="{BB962C8B-B14F-4D97-AF65-F5344CB8AC3E}">
@@ -6011,6 +7182,82 @@
   <p:clrMapOvr>
     <a:masterClrMapping/>
   </p:clrMapOvr>
+</p:sld>
+</file>
+
+<file path=ppt/slides/slide15.xml><?xml version="1.0" encoding="utf-8"?>
+<p:sld xmlns:a="http://schemas.openxmlformats.org/drawingml/2006/main" xmlns:r="http://schemas.openxmlformats.org/officeDocument/2006/relationships" xmlns:p="http://schemas.openxmlformats.org/presentationml/2006/main">
+  <p:cSld>
+    <p:spTree>
+      <p:nvGrpSpPr>
+        <p:cNvPr id="1" name=""/>
+        <p:cNvGrpSpPr/>
+        <p:nvPr/>
+      </p:nvGrpSpPr>
+      <p:grpSpPr>
+        <a:xfrm>
+          <a:off x="0" y="0"/>
+          <a:ext cx="0" cy="0"/>
+          <a:chOff x="0" y="0"/>
+          <a:chExt cx="0" cy="0"/>
+        </a:xfrm>
+      </p:grpSpPr>
+      <p:sp>
+        <p:nvSpPr>
+          <p:cNvPr id="2" name="Title 1">
+            <a:extLst>
+              <a:ext uri="{FF2B5EF4-FFF2-40B4-BE49-F238E27FC236}">
+                <a16:creationId xmlns:a16="http://schemas.microsoft.com/office/drawing/2014/main" id="{0211EABF-91A9-4678-860F-6CA75B2CA051}"/>
+              </a:ext>
+            </a:extLst>
+          </p:cNvPr>
+          <p:cNvSpPr>
+            <a:spLocks noGrp="1"/>
+          </p:cNvSpPr>
+          <p:nvPr>
+            <p:ph type="title"/>
+          </p:nvPr>
+        </p:nvSpPr>
+        <p:spPr>
+          <a:xfrm>
+            <a:off x="685801" y="609600"/>
+            <a:ext cx="10131425" cy="4217377"/>
+          </a:xfrm>
+        </p:spPr>
+        <p:txBody>
+          <a:bodyPr/>
+          <a:lstStyle/>
+          <a:p>
+            <a:pPr algn="ctr"/>
+            <a:r>
+              <a:rPr lang="en-US" dirty="0"/>
+              <a:t>Questions? </a:t>
+            </a:r>
+          </a:p>
+        </p:txBody>
+      </p:sp>
+    </p:spTree>
+    <p:extLst>
+      <p:ext uri="{BB962C8B-B14F-4D97-AF65-F5344CB8AC3E}">
+        <p14:creationId xmlns:p14="http://schemas.microsoft.com/office/powerpoint/2010/main" val="2383072689"/>
+      </p:ext>
+    </p:extLst>
+  </p:cSld>
+  <p:clrMapOvr>
+    <a:masterClrMapping/>
+  </p:clrMapOvr>
+  <mc:AlternateContent xmlns:mc="http://schemas.openxmlformats.org/markup-compatibility/2006">
+    <mc:Choice xmlns:p15="http://schemas.microsoft.com/office/powerpoint/2012/main" Requires="p15">
+      <p:transition xmlns:p14="http://schemas.microsoft.com/office/powerpoint/2010/main" spd="slow" p14:dur="1250">
+        <p15:prstTrans prst="pageCurlDouble"/>
+      </p:transition>
+    </mc:Choice>
+    <mc:Fallback>
+      <p:transition spd="slow">
+        <p:fade/>
+      </p:transition>
+    </mc:Fallback>
+  </mc:AlternateContent>
 </p:sld>
 </file>
 
@@ -6082,13 +7329,13 @@
           <a:p>
             <a:r>
               <a:rPr lang="en-US" dirty="0"/>
-              <a:t>Our project is a frequency analyzer. </a:t>
+              <a:t>Our project is a frequency analyzer</a:t>
             </a:r>
           </a:p>
           <a:p>
             <a:r>
               <a:rPr lang="en-US" dirty="0"/>
-              <a:t>The input is sound, the output is the loudest frequency </a:t>
+              <a:t>The input is sound, the output is the most dominant frequency </a:t>
             </a:r>
           </a:p>
           <a:p>
@@ -6106,6 +7353,9 @@
   <p:clrMapOvr>
     <a:masterClrMapping/>
   </p:clrMapOvr>
+  <p:transition spd="slow">
+    <p:push dir="u"/>
+  </p:transition>
 </p:sld>
 </file>
 
@@ -6149,7 +7399,7 @@
           <a:p>
             <a:r>
               <a:rPr lang="en-US" dirty="0"/>
-              <a:t>TOOLS NEEDED</a:t>
+              <a:t>Build materials </a:t>
             </a:r>
           </a:p>
         </p:txBody>
@@ -6172,10 +7422,69 @@
         </p:nvSpPr>
         <p:spPr/>
         <p:txBody>
-          <a:bodyPr/>
-          <a:lstStyle/>
-          <a:p>
-            <a:endParaRPr lang="en-US"/>
+          <a:bodyPr>
+            <a:normAutofit/>
+          </a:bodyPr>
+          <a:lstStyle/>
+          <a:p>
+            <a:pPr marL="0" indent="0">
+              <a:buNone/>
+            </a:pPr>
+            <a:endParaRPr lang="en-US" dirty="0"/>
+          </a:p>
+          <a:p>
+            <a:r>
+              <a:rPr lang="en-US" dirty="0"/>
+              <a:t>128x32 OLED Screen Arduino ID: 931 </a:t>
+            </a:r>
+          </a:p>
+          <a:p>
+            <a:pPr fontAlgn="t"/>
+            <a:r>
+              <a:rPr lang="en-US" dirty="0"/>
+              <a:t>Electret Microphone Amplifier -MAX4466 with Adjustable Gain[ID: 1063] </a:t>
+            </a:r>
+          </a:p>
+          <a:p>
+            <a:pPr fontAlgn="t"/>
+            <a:r>
+              <a:rPr lang="en-US" dirty="0"/>
+              <a:t>Microchip ATmega328P </a:t>
+            </a:r>
+          </a:p>
+          <a:p>
+            <a:pPr fontAlgn="t"/>
+            <a:r>
+              <a:rPr lang="en-US" dirty="0"/>
+              <a:t>Custom made power regulator </a:t>
+            </a:r>
+          </a:p>
+          <a:p>
+            <a:pPr fontAlgn="t"/>
+            <a:r>
+              <a:rPr lang="en-US" dirty="0"/>
+              <a:t>16 MHz crystal oscillator </a:t>
+            </a:r>
+          </a:p>
+          <a:p>
+            <a:pPr fontAlgn="t"/>
+            <a:r>
+              <a:rPr lang="en-US" dirty="0" err="1"/>
+              <a:t>Furby</a:t>
+            </a:r>
+            <a:br>
+              <a:rPr lang="en-US" dirty="0"/>
+            </a:br>
+            <a:br>
+              <a:rPr lang="en-US" dirty="0"/>
+            </a:br>
+            <a:endParaRPr lang="en-US" dirty="0"/>
+          </a:p>
+          <a:p>
+            <a:endParaRPr lang="en-US" dirty="0"/>
+          </a:p>
+          <a:p>
+            <a:endParaRPr lang="en-US" dirty="0"/>
           </a:p>
         </p:txBody>
       </p:sp>
@@ -6189,6 +7498,9 @@
   <p:clrMapOvr>
     <a:masterClrMapping/>
   </p:clrMapOvr>
+  <p:transition spd="slow">
+    <p:wipe/>
+  </p:transition>
 </p:sld>
 </file>
 
@@ -6258,7 +7570,13 @@
           <a:bodyPr/>
           <a:lstStyle/>
           <a:p>
-            <a:endParaRPr lang="en-US"/>
+            <a:r>
+              <a:rPr lang="en-US" dirty="0"/>
+              <a:t>Will upload pic </a:t>
+            </a:r>
+          </a:p>
+          <a:p>
+            <a:endParaRPr lang="en-US" dirty="0"/>
           </a:p>
         </p:txBody>
       </p:sp>
@@ -6272,6 +7590,18 @@
   <p:clrMapOvr>
     <a:masterClrMapping/>
   </p:clrMapOvr>
+  <mc:AlternateContent xmlns:mc="http://schemas.openxmlformats.org/markup-compatibility/2006">
+    <mc:Choice xmlns:p14="http://schemas.microsoft.com/office/powerpoint/2010/main" Requires="p14">
+      <p:transition spd="slow" p14:dur="3400">
+        <p14:reveal/>
+      </p:transition>
+    </mc:Choice>
+    <mc:Fallback>
+      <p:transition spd="slow">
+        <p:fade/>
+      </p:transition>
+    </mc:Fallback>
+  </mc:AlternateContent>
 </p:sld>
 </file>
 
@@ -6297,7 +7627,7 @@
           <p:cNvPr id="2" name="Title 1">
             <a:extLst>
               <a:ext uri="{FF2B5EF4-FFF2-40B4-BE49-F238E27FC236}">
-                <a16:creationId xmlns:a16="http://schemas.microsoft.com/office/drawing/2014/main" id="{AE3C6A16-1C6A-4735-8A51-D0665535AE5E}"/>
+                <a16:creationId xmlns:a16="http://schemas.microsoft.com/office/drawing/2014/main" id="{55CD2D8D-9E3D-4B08-BD92-E9618B555380}"/>
               </a:ext>
             </a:extLst>
           </p:cNvPr>
@@ -6315,7 +7645,7 @@
           <a:p>
             <a:r>
               <a:rPr lang="en-US" dirty="0"/>
-              <a:t>Schematic for power regulator </a:t>
+              <a:t>OLED specs </a:t>
             </a:r>
           </a:p>
         </p:txBody>
@@ -6325,7 +7655,7 @@
           <p:cNvPr id="3" name="Content Placeholder 2">
             <a:extLst>
               <a:ext uri="{FF2B5EF4-FFF2-40B4-BE49-F238E27FC236}">
-                <a16:creationId xmlns:a16="http://schemas.microsoft.com/office/drawing/2014/main" id="{A88CF914-4450-4243-AFAB-6DB68F0F33C8}"/>
+                <a16:creationId xmlns:a16="http://schemas.microsoft.com/office/drawing/2014/main" id="{40799250-0217-415A-AF00-6BAAA2EDB7A7}"/>
               </a:ext>
             </a:extLst>
           </p:cNvPr>
@@ -6341,20 +7671,50 @@
           <a:bodyPr/>
           <a:lstStyle/>
           <a:p>
-            <a:endParaRPr lang="en-US"/>
+            <a:r>
+              <a:rPr lang="en-US" dirty="0"/>
+              <a:t>Uses SSD 1306 driver chip to communicate with microcontroller via I2C</a:t>
+            </a:r>
+          </a:p>
+          <a:p>
+            <a:r>
+              <a:rPr lang="en-US" dirty="0"/>
+              <a:t>Screen contains 128 x 32 white OLED’s </a:t>
+            </a:r>
+          </a:p>
+          <a:p>
+            <a:r>
+              <a:rPr lang="en-US" dirty="0"/>
+              <a:t>We chose OLED because it does not require a back light, which decreases power consumption </a:t>
+            </a:r>
+          </a:p>
+          <a:p>
+            <a:endParaRPr lang="en-US" dirty="0"/>
           </a:p>
         </p:txBody>
       </p:sp>
     </p:spTree>
     <p:extLst>
       <p:ext uri="{BB962C8B-B14F-4D97-AF65-F5344CB8AC3E}">
-        <p14:creationId xmlns:p14="http://schemas.microsoft.com/office/powerpoint/2010/main" val="3786965788"/>
+        <p14:creationId xmlns:p14="http://schemas.microsoft.com/office/powerpoint/2010/main" val="810425185"/>
       </p:ext>
     </p:extLst>
   </p:cSld>
   <p:clrMapOvr>
     <a:masterClrMapping/>
   </p:clrMapOvr>
+  <mc:AlternateContent xmlns:mc="http://schemas.openxmlformats.org/markup-compatibility/2006">
+    <mc:Choice xmlns:p14="http://schemas.microsoft.com/office/powerpoint/2010/main" Requires="p14">
+      <p:transition spd="slow">
+        <p14:flash/>
+      </p:transition>
+    </mc:Choice>
+    <mc:Fallback>
+      <p:transition spd="slow">
+        <p:fade/>
+      </p:transition>
+    </mc:Fallback>
+  </mc:AlternateContent>
 </p:sld>
 </file>
 
@@ -6380,7 +7740,7 @@
           <p:cNvPr id="2" name="Title 1">
             <a:extLst>
               <a:ext uri="{FF2B5EF4-FFF2-40B4-BE49-F238E27FC236}">
-                <a16:creationId xmlns:a16="http://schemas.microsoft.com/office/drawing/2014/main" id="{20BB7399-4610-4FF5-9C5E-64FFCD0EE6F2}"/>
+                <a16:creationId xmlns:a16="http://schemas.microsoft.com/office/drawing/2014/main" id="{AE3C6A16-1C6A-4735-8A51-D0665535AE5E}"/>
               </a:ext>
             </a:extLst>
           </p:cNvPr>
@@ -6398,7 +7758,7 @@
           <a:p>
             <a:r>
               <a:rPr lang="en-US" dirty="0"/>
-              <a:t>Schematic for microphone</a:t>
+              <a:t>Schematic for power regulator </a:t>
             </a:r>
           </a:p>
         </p:txBody>
@@ -6408,7 +7768,7 @@
           <p:cNvPr id="3" name="Content Placeholder 2">
             <a:extLst>
               <a:ext uri="{FF2B5EF4-FFF2-40B4-BE49-F238E27FC236}">
-                <a16:creationId xmlns:a16="http://schemas.microsoft.com/office/drawing/2014/main" id="{AE75684C-7974-4C18-BEFA-D28D71FC23ED}"/>
+                <a16:creationId xmlns:a16="http://schemas.microsoft.com/office/drawing/2014/main" id="{A88CF914-4450-4243-AFAB-6DB68F0F33C8}"/>
               </a:ext>
             </a:extLst>
           </p:cNvPr>
@@ -6424,20 +7784,38 @@
           <a:bodyPr/>
           <a:lstStyle/>
           <a:p>
-            <a:endParaRPr lang="en-US"/>
+            <a:r>
+              <a:rPr lang="en-US" dirty="0"/>
+              <a:t>Will upload pic </a:t>
+            </a:r>
+          </a:p>
+          <a:p>
+            <a:endParaRPr lang="en-US" dirty="0"/>
           </a:p>
         </p:txBody>
       </p:sp>
     </p:spTree>
     <p:extLst>
       <p:ext uri="{BB962C8B-B14F-4D97-AF65-F5344CB8AC3E}">
-        <p14:creationId xmlns:p14="http://schemas.microsoft.com/office/powerpoint/2010/main" val="4053684913"/>
+        <p14:creationId xmlns:p14="http://schemas.microsoft.com/office/powerpoint/2010/main" val="3786965788"/>
       </p:ext>
     </p:extLst>
   </p:cSld>
   <p:clrMapOvr>
     <a:masterClrMapping/>
   </p:clrMapOvr>
+  <mc:AlternateContent xmlns:mc="http://schemas.openxmlformats.org/markup-compatibility/2006">
+    <mc:Choice xmlns:p15="http://schemas.microsoft.com/office/powerpoint/2012/main" Requires="p15">
+      <p:transition xmlns:p14="http://schemas.microsoft.com/office/powerpoint/2010/main" spd="slow" p14:dur="2000">
+        <p15:prstTrans prst="crush"/>
+      </p:transition>
+    </mc:Choice>
+    <mc:Fallback>
+      <p:transition spd="slow">
+        <p:fade/>
+      </p:transition>
+    </mc:Fallback>
+  </mc:AlternateContent>
 </p:sld>
 </file>
 
@@ -6463,7 +7841,7 @@
           <p:cNvPr id="2" name="Title 1">
             <a:extLst>
               <a:ext uri="{FF2B5EF4-FFF2-40B4-BE49-F238E27FC236}">
-                <a16:creationId xmlns:a16="http://schemas.microsoft.com/office/drawing/2014/main" id="{E0649754-1368-4983-927C-2FB6D1909899}"/>
+                <a16:creationId xmlns:a16="http://schemas.microsoft.com/office/drawing/2014/main" id="{6B401CA1-3EF7-45B0-B0F8-8C0A7C4E21EC}"/>
               </a:ext>
             </a:extLst>
           </p:cNvPr>
@@ -6481,54 +7859,468 @@
           <a:p>
             <a:r>
               <a:rPr lang="en-US" dirty="0"/>
-              <a:t>Schematic for </a:t>
-            </a:r>
-            <a:r>
-              <a:rPr lang="en-US" dirty="0" err="1"/>
-              <a:t>atmega</a:t>
-            </a:r>
-            <a:r>
-              <a:rPr lang="en-US" dirty="0"/>
-              <a:t> 328p</a:t>
-            </a:r>
-          </a:p>
-        </p:txBody>
-      </p:sp>
-      <p:sp>
-        <p:nvSpPr>
-          <p:cNvPr id="3" name="Content Placeholder 2">
-            <a:extLst>
-              <a:ext uri="{FF2B5EF4-FFF2-40B4-BE49-F238E27FC236}">
-                <a16:creationId xmlns:a16="http://schemas.microsoft.com/office/drawing/2014/main" id="{E32DABB6-B9BD-46E6-8FF6-CAF4F177E0AA}"/>
-              </a:ext>
-            </a:extLst>
-          </p:cNvPr>
-          <p:cNvSpPr>
-            <a:spLocks noGrp="1"/>
-          </p:cNvSpPr>
-          <p:nvPr>
-            <p:ph idx="1"/>
-          </p:nvPr>
-        </p:nvSpPr>
-        <p:spPr/>
-        <p:txBody>
-          <a:bodyPr/>
-          <a:lstStyle/>
-          <a:p>
-            <a:endParaRPr lang="en-US"/>
-          </a:p>
-        </p:txBody>
-      </p:sp>
+              <a:t>Power regulator specs </a:t>
+            </a:r>
+          </a:p>
+        </p:txBody>
+      </p:sp>
+      <mc:AlternateContent xmlns:mc="http://schemas.openxmlformats.org/markup-compatibility/2006">
+        <mc:Choice xmlns:a14="http://schemas.microsoft.com/office/drawing/2010/main" Requires="a14">
+          <p:sp>
+            <p:nvSpPr>
+              <p:cNvPr id="3" name="Content Placeholder 2">
+                <a:extLst>
+                  <a:ext uri="{FF2B5EF4-FFF2-40B4-BE49-F238E27FC236}">
+                    <a16:creationId xmlns:a16="http://schemas.microsoft.com/office/drawing/2014/main" id="{D501583C-2784-4F91-B9FA-F2F78831E5CD}"/>
+                  </a:ext>
+                </a:extLst>
+              </p:cNvPr>
+              <p:cNvSpPr>
+                <a:spLocks noGrp="1"/>
+              </p:cNvSpPr>
+              <p:nvPr>
+                <p:ph idx="1"/>
+              </p:nvPr>
+            </p:nvSpPr>
+            <p:spPr/>
+            <p:txBody>
+              <a:bodyPr/>
+              <a:lstStyle/>
+              <a:p>
+                <a:pPr fontAlgn="t"/>
+                <a:r>
+                  <a:rPr lang="en-US" dirty="0"/>
+                  <a:t>LM7805 voltage regulator </a:t>
+                </a:r>
+              </a:p>
+              <a:p>
+                <a:pPr fontAlgn="t"/>
+                <a:r>
+                  <a:rPr lang="en-US" dirty="0"/>
+                  <a:t>2 x 0.1 </a:t>
+                </a:r>
+                <a14:m>
+                  <m:oMath xmlns:m="http://schemas.openxmlformats.org/officeDocument/2006/math">
+                    <m:r>
+                      <a:rPr lang="en-US" i="1">
+                        <a:latin typeface="Cambria Math" panose="02040503050406030204" pitchFamily="18" charset="0"/>
+                        <a:ea typeface="Cambria Math" panose="02040503050406030204" pitchFamily="18" charset="0"/>
+                      </a:rPr>
+                      <m:t>𝜇</m:t>
+                    </m:r>
+                    <m:r>
+                      <m:rPr>
+                        <m:sty m:val="p"/>
+                      </m:rPr>
+                      <a:rPr lang="en-US">
+                        <a:latin typeface="Cambria Math" panose="02040503050406030204" pitchFamily="18" charset="0"/>
+                        <a:ea typeface="Cambria Math" panose="02040503050406030204" pitchFamily="18" charset="0"/>
+                      </a:rPr>
+                      <m:t>F</m:t>
+                    </m:r>
+                    <m:r>
+                      <a:rPr lang="en-US">
+                        <a:latin typeface="Cambria Math" panose="02040503050406030204" pitchFamily="18" charset="0"/>
+                        <a:ea typeface="Cambria Math" panose="02040503050406030204" pitchFamily="18" charset="0"/>
+                      </a:rPr>
+                      <m:t> </m:t>
+                    </m:r>
+                    <m:r>
+                      <m:rPr>
+                        <m:sty m:val="p"/>
+                      </m:rPr>
+                      <a:rPr lang="en-US">
+                        <a:latin typeface="Cambria Math" panose="02040503050406030204" pitchFamily="18" charset="0"/>
+                        <a:ea typeface="Cambria Math" panose="02040503050406030204" pitchFamily="18" charset="0"/>
+                      </a:rPr>
+                      <m:t>capacitors</m:t>
+                    </m:r>
+                  </m:oMath>
+                </a14:m>
+                <a:endParaRPr lang="en-US" dirty="0">
+                  <a:ea typeface="Cambria Math" panose="02040503050406030204" pitchFamily="18" charset="0"/>
+                </a:endParaRPr>
+              </a:p>
+              <a:p>
+                <a:pPr fontAlgn="t"/>
+                <a:r>
+                  <a:rPr lang="en-US" dirty="0">
+                    <a:ea typeface="Cambria Math" panose="02040503050406030204" pitchFamily="18" charset="0"/>
+                  </a:rPr>
+                  <a:t>1000V Silicone Diode</a:t>
+                </a:r>
+              </a:p>
+              <a:p>
+                <a:endParaRPr lang="en-US" dirty="0"/>
+              </a:p>
+            </p:txBody>
+          </p:sp>
+        </mc:Choice>
+        <mc:Fallback>
+          <p:sp>
+            <p:nvSpPr>
+              <p:cNvPr id="3" name="Content Placeholder 2">
+                <a:extLst>
+                  <a:ext uri="{FF2B5EF4-FFF2-40B4-BE49-F238E27FC236}">
+                    <a16:creationId xmlns:a16="http://schemas.microsoft.com/office/drawing/2014/main" id="{D501583C-2784-4F91-B9FA-F2F78831E5CD}"/>
+                  </a:ext>
+                </a:extLst>
+              </p:cNvPr>
+              <p:cNvSpPr>
+                <a:spLocks noGrp="1" noRot="1" noChangeAspect="1" noMove="1" noResize="1" noEditPoints="1" noAdjustHandles="1" noChangeArrowheads="1" noChangeShapeType="1" noTextEdit="1"/>
+              </p:cNvSpPr>
+              <p:nvPr>
+                <p:ph idx="1"/>
+              </p:nvPr>
+            </p:nvSpPr>
+            <p:spPr>
+              <a:blipFill>
+                <a:blip r:embed="rId2"/>
+                <a:stretch>
+                  <a:fillRect l="-421"/>
+                </a:stretch>
+              </a:blipFill>
+            </p:spPr>
+            <p:txBody>
+              <a:bodyPr/>
+              <a:lstStyle/>
+              <a:p>
+                <a:r>
+                  <a:rPr lang="en-US">
+                    <a:noFill/>
+                  </a:rPr>
+                  <a:t> </a:t>
+                </a:r>
+              </a:p>
+            </p:txBody>
+          </p:sp>
+        </mc:Fallback>
+      </mc:AlternateContent>
     </p:spTree>
     <p:extLst>
       <p:ext uri="{BB962C8B-B14F-4D97-AF65-F5344CB8AC3E}">
-        <p14:creationId xmlns:p14="http://schemas.microsoft.com/office/powerpoint/2010/main" val="756373120"/>
+        <p14:creationId xmlns:p14="http://schemas.microsoft.com/office/powerpoint/2010/main" val="1239745404"/>
       </p:ext>
     </p:extLst>
   </p:cSld>
   <p:clrMapOvr>
     <a:masterClrMapping/>
   </p:clrMapOvr>
+  <mc:AlternateContent xmlns:mc="http://schemas.openxmlformats.org/markup-compatibility/2006">
+    <mc:Choice xmlns:p14="http://schemas.microsoft.com/office/powerpoint/2010/main" Requires="p14">
+      <p:transition spd="slow" p14:dur="4400">
+        <p14:honeycomb/>
+      </p:transition>
+    </mc:Choice>
+    <mc:Fallback>
+      <p:transition spd="slow">
+        <p:fade/>
+      </p:transition>
+    </mc:Fallback>
+  </mc:AlternateContent>
+  <p:timing>
+    <p:tnLst>
+      <p:par>
+        <p:cTn id="1" dur="indefinite" restart="never" nodeType="tmRoot">
+          <p:childTnLst>
+            <p:seq concurrent="1" nextAc="seek">
+              <p:cTn id="2" dur="indefinite" nodeType="mainSeq">
+                <p:childTnLst>
+                  <p:par>
+                    <p:cTn id="3" fill="hold">
+                      <p:stCondLst>
+                        <p:cond delay="indefinite"/>
+                      </p:stCondLst>
+                      <p:childTnLst>
+                        <p:par>
+                          <p:cTn id="4" fill="hold">
+                            <p:stCondLst>
+                              <p:cond delay="0"/>
+                            </p:stCondLst>
+                            <p:childTnLst>
+                              <p:par>
+                                <p:cTn id="5" presetID="2" presetClass="entr" presetSubtype="4" fill="hold" nodeType="clickEffect">
+                                  <p:stCondLst>
+                                    <p:cond delay="0"/>
+                                  </p:stCondLst>
+                                  <p:childTnLst>
+                                    <p:set>
+                                      <p:cBhvr>
+                                        <p:cTn id="6" dur="1" fill="hold">
+                                          <p:stCondLst>
+                                            <p:cond delay="0"/>
+                                          </p:stCondLst>
+                                        </p:cTn>
+                                        <p:tgtEl>
+                                          <p:spTgt spid="3">
+                                            <p:txEl>
+                                              <p:pRg st="0" end="0"/>
+                                            </p:txEl>
+                                          </p:spTgt>
+                                        </p:tgtEl>
+                                        <p:attrNameLst>
+                                          <p:attrName>style.visibility</p:attrName>
+                                        </p:attrNameLst>
+                                      </p:cBhvr>
+                                      <p:to>
+                                        <p:strVal val="visible"/>
+                                      </p:to>
+                                    </p:set>
+                                    <p:anim calcmode="lin" valueType="num">
+                                      <p:cBhvr additive="base">
+                                        <p:cTn id="7" dur="500" fill="hold"/>
+                                        <p:tgtEl>
+                                          <p:spTgt spid="3">
+                                            <p:txEl>
+                                              <p:pRg st="0" end="0"/>
+                                            </p:txEl>
+                                          </p:spTgt>
+                                        </p:tgtEl>
+                                        <p:attrNameLst>
+                                          <p:attrName>ppt_x</p:attrName>
+                                        </p:attrNameLst>
+                                      </p:cBhvr>
+                                      <p:tavLst>
+                                        <p:tav tm="0">
+                                          <p:val>
+                                            <p:strVal val="#ppt_x"/>
+                                          </p:val>
+                                        </p:tav>
+                                        <p:tav tm="100000">
+                                          <p:val>
+                                            <p:strVal val="#ppt_x"/>
+                                          </p:val>
+                                        </p:tav>
+                                      </p:tavLst>
+                                    </p:anim>
+                                    <p:anim calcmode="lin" valueType="num">
+                                      <p:cBhvr additive="base">
+                                        <p:cTn id="8" dur="500" fill="hold"/>
+                                        <p:tgtEl>
+                                          <p:spTgt spid="3">
+                                            <p:txEl>
+                                              <p:pRg st="0" end="0"/>
+                                            </p:txEl>
+                                          </p:spTgt>
+                                        </p:tgtEl>
+                                        <p:attrNameLst>
+                                          <p:attrName>ppt_y</p:attrName>
+                                        </p:attrNameLst>
+                                      </p:cBhvr>
+                                      <p:tavLst>
+                                        <p:tav tm="0">
+                                          <p:val>
+                                            <p:strVal val="1+#ppt_h/2"/>
+                                          </p:val>
+                                        </p:tav>
+                                        <p:tav tm="100000">
+                                          <p:val>
+                                            <p:strVal val="#ppt_y"/>
+                                          </p:val>
+                                        </p:tav>
+                                      </p:tavLst>
+                                    </p:anim>
+                                  </p:childTnLst>
+                                </p:cTn>
+                              </p:par>
+                              <p:par>
+                                <p:cTn id="9" presetID="2" presetClass="entr" presetSubtype="4" fill="hold" nodeType="withEffect">
+                                  <p:stCondLst>
+                                    <p:cond delay="0"/>
+                                  </p:stCondLst>
+                                  <p:childTnLst>
+                                    <p:set>
+                                      <p:cBhvr>
+                                        <p:cTn id="10" dur="1" fill="hold">
+                                          <p:stCondLst>
+                                            <p:cond delay="0"/>
+                                          </p:stCondLst>
+                                        </p:cTn>
+                                        <p:tgtEl>
+                                          <p:spTgt spid="3">
+                                            <p:txEl>
+                                              <p:pRg st="1" end="1"/>
+                                            </p:txEl>
+                                          </p:spTgt>
+                                        </p:tgtEl>
+                                        <p:attrNameLst>
+                                          <p:attrName>style.visibility</p:attrName>
+                                        </p:attrNameLst>
+                                      </p:cBhvr>
+                                      <p:to>
+                                        <p:strVal val="visible"/>
+                                      </p:to>
+                                    </p:set>
+                                    <p:anim calcmode="lin" valueType="num">
+                                      <p:cBhvr additive="base">
+                                        <p:cTn id="11" dur="500" fill="hold"/>
+                                        <p:tgtEl>
+                                          <p:spTgt spid="3">
+                                            <p:txEl>
+                                              <p:pRg st="1" end="1"/>
+                                            </p:txEl>
+                                          </p:spTgt>
+                                        </p:tgtEl>
+                                        <p:attrNameLst>
+                                          <p:attrName>ppt_x</p:attrName>
+                                        </p:attrNameLst>
+                                      </p:cBhvr>
+                                      <p:tavLst>
+                                        <p:tav tm="0">
+                                          <p:val>
+                                            <p:strVal val="#ppt_x"/>
+                                          </p:val>
+                                        </p:tav>
+                                        <p:tav tm="100000">
+                                          <p:val>
+                                            <p:strVal val="#ppt_x"/>
+                                          </p:val>
+                                        </p:tav>
+                                      </p:tavLst>
+                                    </p:anim>
+                                    <p:anim calcmode="lin" valueType="num">
+                                      <p:cBhvr additive="base">
+                                        <p:cTn id="12" dur="500" fill="hold"/>
+                                        <p:tgtEl>
+                                          <p:spTgt spid="3">
+                                            <p:txEl>
+                                              <p:pRg st="1" end="1"/>
+                                            </p:txEl>
+                                          </p:spTgt>
+                                        </p:tgtEl>
+                                        <p:attrNameLst>
+                                          <p:attrName>ppt_y</p:attrName>
+                                        </p:attrNameLst>
+                                      </p:cBhvr>
+                                      <p:tavLst>
+                                        <p:tav tm="0">
+                                          <p:val>
+                                            <p:strVal val="1+#ppt_h/2"/>
+                                          </p:val>
+                                        </p:tav>
+                                        <p:tav tm="100000">
+                                          <p:val>
+                                            <p:strVal val="#ppt_y"/>
+                                          </p:val>
+                                        </p:tav>
+                                      </p:tavLst>
+                                    </p:anim>
+                                  </p:childTnLst>
+                                </p:cTn>
+                              </p:par>
+                              <p:par>
+                                <p:cTn id="13" presetID="2" presetClass="entr" presetSubtype="4" fill="hold" nodeType="withEffect">
+                                  <p:stCondLst>
+                                    <p:cond delay="0"/>
+                                  </p:stCondLst>
+                                  <p:childTnLst>
+                                    <p:set>
+                                      <p:cBhvr>
+                                        <p:cTn id="14" dur="1" fill="hold">
+                                          <p:stCondLst>
+                                            <p:cond delay="0"/>
+                                          </p:stCondLst>
+                                        </p:cTn>
+                                        <p:tgtEl>
+                                          <p:spTgt spid="3">
+                                            <p:txEl>
+                                              <p:pRg st="2" end="2"/>
+                                            </p:txEl>
+                                          </p:spTgt>
+                                        </p:tgtEl>
+                                        <p:attrNameLst>
+                                          <p:attrName>style.visibility</p:attrName>
+                                        </p:attrNameLst>
+                                      </p:cBhvr>
+                                      <p:to>
+                                        <p:strVal val="visible"/>
+                                      </p:to>
+                                    </p:set>
+                                    <p:anim calcmode="lin" valueType="num">
+                                      <p:cBhvr additive="base">
+                                        <p:cTn id="15" dur="500" fill="hold"/>
+                                        <p:tgtEl>
+                                          <p:spTgt spid="3">
+                                            <p:txEl>
+                                              <p:pRg st="2" end="2"/>
+                                            </p:txEl>
+                                          </p:spTgt>
+                                        </p:tgtEl>
+                                        <p:attrNameLst>
+                                          <p:attrName>ppt_x</p:attrName>
+                                        </p:attrNameLst>
+                                      </p:cBhvr>
+                                      <p:tavLst>
+                                        <p:tav tm="0">
+                                          <p:val>
+                                            <p:strVal val="#ppt_x"/>
+                                          </p:val>
+                                        </p:tav>
+                                        <p:tav tm="100000">
+                                          <p:val>
+                                            <p:strVal val="#ppt_x"/>
+                                          </p:val>
+                                        </p:tav>
+                                      </p:tavLst>
+                                    </p:anim>
+                                    <p:anim calcmode="lin" valueType="num">
+                                      <p:cBhvr additive="base">
+                                        <p:cTn id="16" dur="500" fill="hold"/>
+                                        <p:tgtEl>
+                                          <p:spTgt spid="3">
+                                            <p:txEl>
+                                              <p:pRg st="2" end="2"/>
+                                            </p:txEl>
+                                          </p:spTgt>
+                                        </p:tgtEl>
+                                        <p:attrNameLst>
+                                          <p:attrName>ppt_y</p:attrName>
+                                        </p:attrNameLst>
+                                      </p:cBhvr>
+                                      <p:tavLst>
+                                        <p:tav tm="0">
+                                          <p:val>
+                                            <p:strVal val="1+#ppt_h/2"/>
+                                          </p:val>
+                                        </p:tav>
+                                        <p:tav tm="100000">
+                                          <p:val>
+                                            <p:strVal val="#ppt_y"/>
+                                          </p:val>
+                                        </p:tav>
+                                      </p:tavLst>
+                                    </p:anim>
+                                  </p:childTnLst>
+                                </p:cTn>
+                              </p:par>
+                            </p:childTnLst>
+                          </p:cTn>
+                        </p:par>
+                      </p:childTnLst>
+                    </p:cTn>
+                  </p:par>
+                </p:childTnLst>
+              </p:cTn>
+              <p:prevCondLst>
+                <p:cond evt="onPrev" delay="0">
+                  <p:tgtEl>
+                    <p:sldTgt/>
+                  </p:tgtEl>
+                </p:cond>
+              </p:prevCondLst>
+              <p:nextCondLst>
+                <p:cond evt="onNext" delay="0">
+                  <p:tgtEl>
+                    <p:sldTgt/>
+                  </p:tgtEl>
+                </p:cond>
+              </p:nextCondLst>
+            </p:seq>
+          </p:childTnLst>
+        </p:cTn>
+      </p:par>
+    </p:tnLst>
+  </p:timing>
 </p:sld>
 </file>
 
@@ -6554,7 +8346,7 @@
           <p:cNvPr id="2" name="Title 1">
             <a:extLst>
               <a:ext uri="{FF2B5EF4-FFF2-40B4-BE49-F238E27FC236}">
-                <a16:creationId xmlns:a16="http://schemas.microsoft.com/office/drawing/2014/main" id="{F4091B77-3050-4CD5-9CB0-091C190E7B1B}"/>
+                <a16:creationId xmlns:a16="http://schemas.microsoft.com/office/drawing/2014/main" id="{20BB7399-4610-4FF5-9C5E-64FFCD0EE6F2}"/>
               </a:ext>
             </a:extLst>
           </p:cNvPr>
@@ -6572,7 +8364,7 @@
           <a:p>
             <a:r>
               <a:rPr lang="en-US" dirty="0"/>
-              <a:t>Frequency determination </a:t>
+              <a:t>Schematic for microphone</a:t>
             </a:r>
           </a:p>
         </p:txBody>
@@ -6582,7 +8374,7 @@
           <p:cNvPr id="3" name="Content Placeholder 2">
             <a:extLst>
               <a:ext uri="{FF2B5EF4-FFF2-40B4-BE49-F238E27FC236}">
-                <a16:creationId xmlns:a16="http://schemas.microsoft.com/office/drawing/2014/main" id="{D2D76396-8595-4CA1-88CD-AE56111DE7BA}"/>
+                <a16:creationId xmlns:a16="http://schemas.microsoft.com/office/drawing/2014/main" id="{AE75684C-7974-4C18-BEFA-D28D71FC23ED}"/>
               </a:ext>
             </a:extLst>
           </p:cNvPr>
@@ -6598,20 +8390,35 @@
           <a:bodyPr/>
           <a:lstStyle/>
           <a:p>
-            <a:endParaRPr lang="en-US"/>
+            <a:endParaRPr lang="en-US" dirty="0"/>
+          </a:p>
+          <a:p>
+            <a:endParaRPr lang="en-US" dirty="0"/>
           </a:p>
         </p:txBody>
       </p:sp>
     </p:spTree>
     <p:extLst>
       <p:ext uri="{BB962C8B-B14F-4D97-AF65-F5344CB8AC3E}">
-        <p14:creationId xmlns:p14="http://schemas.microsoft.com/office/powerpoint/2010/main" val="1152952955"/>
+        <p14:creationId xmlns:p14="http://schemas.microsoft.com/office/powerpoint/2010/main" val="4053684913"/>
       </p:ext>
     </p:extLst>
   </p:cSld>
   <p:clrMapOvr>
     <a:masterClrMapping/>
   </p:clrMapOvr>
+  <mc:AlternateContent xmlns:mc="http://schemas.openxmlformats.org/markup-compatibility/2006">
+    <mc:Choice xmlns:p15="http://schemas.microsoft.com/office/powerpoint/2012/main" Requires="p15">
+      <p:transition xmlns:p14="http://schemas.microsoft.com/office/powerpoint/2010/main" spd="slow" p14:dur="2000">
+        <p15:prstTrans prst="fracture"/>
+      </p:transition>
+    </mc:Choice>
+    <mc:Fallback>
+      <p:transition spd="slow">
+        <p:fade/>
+      </p:transition>
+    </mc:Fallback>
+  </mc:AlternateContent>
 </p:sld>
 </file>
 
@@ -6637,7 +8444,7 @@
           <p:cNvPr id="2" name="Title 1">
             <a:extLst>
               <a:ext uri="{FF2B5EF4-FFF2-40B4-BE49-F238E27FC236}">
-                <a16:creationId xmlns:a16="http://schemas.microsoft.com/office/drawing/2014/main" id="{A58B5A4A-4E11-4780-A6C3-2D57CB2B7FE1}"/>
+                <a16:creationId xmlns:a16="http://schemas.microsoft.com/office/drawing/2014/main" id="{30204706-C8DF-4444-A907-EEC8539167A1}"/>
               </a:ext>
             </a:extLst>
           </p:cNvPr>
@@ -6655,7 +8462,7 @@
           <a:p>
             <a:r>
               <a:rPr lang="en-US" dirty="0"/>
-              <a:t>Software </a:t>
+              <a:t>Microphone module specs </a:t>
             </a:r>
           </a:p>
         </p:txBody>
@@ -6665,7 +8472,7 @@
           <p:cNvPr id="3" name="Content Placeholder 2">
             <a:extLst>
               <a:ext uri="{FF2B5EF4-FFF2-40B4-BE49-F238E27FC236}">
-                <a16:creationId xmlns:a16="http://schemas.microsoft.com/office/drawing/2014/main" id="{28CDF226-AD79-4F2D-84C3-9B99D6B81B10}"/>
+                <a16:creationId xmlns:a16="http://schemas.microsoft.com/office/drawing/2014/main" id="{334214DC-4211-451D-8DBF-B0E44F838B60}"/>
               </a:ext>
             </a:extLst>
           </p:cNvPr>
@@ -6681,20 +8488,283 @@
           <a:bodyPr/>
           <a:lstStyle/>
           <a:p>
-            <a:endParaRPr lang="en-US"/>
+            <a:r>
+              <a:rPr lang="en-US" dirty="0"/>
+              <a:t>Omnidirectional electret condenser microphone with operation frequency of 20-20,000 hertz  </a:t>
+            </a:r>
+          </a:p>
+          <a:p>
+            <a:r>
+              <a:rPr lang="en-US" dirty="0"/>
+              <a:t>Includes a MAX 4465 op amp to amplify signal to the range 0-5 volts, centered at 2.5 for the Arduino </a:t>
+            </a:r>
+          </a:p>
+          <a:p>
+            <a:endParaRPr lang="en-US" dirty="0"/>
+          </a:p>
+          <a:p>
+            <a:endParaRPr lang="en-US" dirty="0"/>
           </a:p>
         </p:txBody>
       </p:sp>
     </p:spTree>
     <p:extLst>
       <p:ext uri="{BB962C8B-B14F-4D97-AF65-F5344CB8AC3E}">
-        <p14:creationId xmlns:p14="http://schemas.microsoft.com/office/powerpoint/2010/main" val="122623077"/>
+        <p14:creationId xmlns:p14="http://schemas.microsoft.com/office/powerpoint/2010/main" val="1251801385"/>
       </p:ext>
     </p:extLst>
   </p:cSld>
   <p:clrMapOvr>
     <a:masterClrMapping/>
   </p:clrMapOvr>
+  <mc:AlternateContent xmlns:mc="http://schemas.openxmlformats.org/markup-compatibility/2006">
+    <mc:Choice xmlns:p159="http://schemas.microsoft.com/office/powerpoint/2015/09/main" Requires="p159">
+      <p:transition xmlns:p14="http://schemas.microsoft.com/office/powerpoint/2010/main" spd="slow" p14:dur="2000">
+        <p159:morph option="byObject"/>
+      </p:transition>
+    </mc:Choice>
+    <mc:Fallback>
+      <p:transition spd="slow">
+        <p:fade/>
+      </p:transition>
+    </mc:Fallback>
+  </mc:AlternateContent>
+  <p:timing>
+    <p:tnLst>
+      <p:par>
+        <p:cTn id="1" dur="indefinite" restart="never" nodeType="tmRoot">
+          <p:childTnLst>
+            <p:seq concurrent="1" nextAc="seek">
+              <p:cTn id="2" dur="indefinite" nodeType="mainSeq">
+                <p:childTnLst>
+                  <p:par>
+                    <p:cTn id="3" fill="hold">
+                      <p:stCondLst>
+                        <p:cond delay="indefinite"/>
+                      </p:stCondLst>
+                      <p:childTnLst>
+                        <p:par>
+                          <p:cTn id="4" fill="hold">
+                            <p:stCondLst>
+                              <p:cond delay="0"/>
+                            </p:stCondLst>
+                            <p:childTnLst>
+                              <p:par>
+                                <p:cTn id="5" presetID="2" presetClass="entr" presetSubtype="4" fill="hold" nodeType="clickEffect">
+                                  <p:stCondLst>
+                                    <p:cond delay="0"/>
+                                  </p:stCondLst>
+                                  <p:childTnLst>
+                                    <p:set>
+                                      <p:cBhvr>
+                                        <p:cTn id="6" dur="1" fill="hold">
+                                          <p:stCondLst>
+                                            <p:cond delay="0"/>
+                                          </p:stCondLst>
+                                        </p:cTn>
+                                        <p:tgtEl>
+                                          <p:spTgt spid="3">
+                                            <p:txEl>
+                                              <p:pRg st="0" end="0"/>
+                                            </p:txEl>
+                                          </p:spTgt>
+                                        </p:tgtEl>
+                                        <p:attrNameLst>
+                                          <p:attrName>style.visibility</p:attrName>
+                                        </p:attrNameLst>
+                                      </p:cBhvr>
+                                      <p:to>
+                                        <p:strVal val="visible"/>
+                                      </p:to>
+                                    </p:set>
+                                    <p:anim calcmode="lin" valueType="num">
+                                      <p:cBhvr additive="base">
+                                        <p:cTn id="7" dur="500" fill="hold"/>
+                                        <p:tgtEl>
+                                          <p:spTgt spid="3">
+                                            <p:txEl>
+                                              <p:pRg st="0" end="0"/>
+                                            </p:txEl>
+                                          </p:spTgt>
+                                        </p:tgtEl>
+                                        <p:attrNameLst>
+                                          <p:attrName>ppt_x</p:attrName>
+                                        </p:attrNameLst>
+                                      </p:cBhvr>
+                                      <p:tavLst>
+                                        <p:tav tm="0">
+                                          <p:val>
+                                            <p:strVal val="#ppt_x"/>
+                                          </p:val>
+                                        </p:tav>
+                                        <p:tav tm="100000">
+                                          <p:val>
+                                            <p:strVal val="#ppt_x"/>
+                                          </p:val>
+                                        </p:tav>
+                                      </p:tavLst>
+                                    </p:anim>
+                                    <p:anim calcmode="lin" valueType="num">
+                                      <p:cBhvr additive="base">
+                                        <p:cTn id="8" dur="500" fill="hold"/>
+                                        <p:tgtEl>
+                                          <p:spTgt spid="3">
+                                            <p:txEl>
+                                              <p:pRg st="0" end="0"/>
+                                            </p:txEl>
+                                          </p:spTgt>
+                                        </p:tgtEl>
+                                        <p:attrNameLst>
+                                          <p:attrName>ppt_y</p:attrName>
+                                        </p:attrNameLst>
+                                      </p:cBhvr>
+                                      <p:tavLst>
+                                        <p:tav tm="0">
+                                          <p:val>
+                                            <p:strVal val="1+#ppt_h/2"/>
+                                          </p:val>
+                                        </p:tav>
+                                        <p:tav tm="100000">
+                                          <p:val>
+                                            <p:strVal val="#ppt_y"/>
+                                          </p:val>
+                                        </p:tav>
+                                      </p:tavLst>
+                                    </p:anim>
+                                  </p:childTnLst>
+                                </p:cTn>
+                              </p:par>
+                            </p:childTnLst>
+                          </p:cTn>
+                        </p:par>
+                      </p:childTnLst>
+                    </p:cTn>
+                  </p:par>
+                  <p:par>
+                    <p:cTn id="9" fill="hold">
+                      <p:stCondLst>
+                        <p:cond delay="indefinite"/>
+                      </p:stCondLst>
+                      <p:childTnLst>
+                        <p:par>
+                          <p:cTn id="10" fill="hold">
+                            <p:stCondLst>
+                              <p:cond delay="0"/>
+                            </p:stCondLst>
+                            <p:childTnLst>
+                              <p:par>
+                                <p:cTn id="11" presetID="2" presetClass="entr" presetSubtype="4" fill="hold" nodeType="clickEffect">
+                                  <p:stCondLst>
+                                    <p:cond delay="0"/>
+                                  </p:stCondLst>
+                                  <p:childTnLst>
+                                    <p:set>
+                                      <p:cBhvr>
+                                        <p:cTn id="12" dur="1" fill="hold">
+                                          <p:stCondLst>
+                                            <p:cond delay="0"/>
+                                          </p:stCondLst>
+                                        </p:cTn>
+                                        <p:tgtEl>
+                                          <p:spTgt spid="3">
+                                            <p:txEl>
+                                              <p:pRg st="1" end="1"/>
+                                            </p:txEl>
+                                          </p:spTgt>
+                                        </p:tgtEl>
+                                        <p:attrNameLst>
+                                          <p:attrName>style.visibility</p:attrName>
+                                        </p:attrNameLst>
+                                      </p:cBhvr>
+                                      <p:to>
+                                        <p:strVal val="visible"/>
+                                      </p:to>
+                                    </p:set>
+                                    <p:anim calcmode="lin" valueType="num">
+                                      <p:cBhvr additive="base">
+                                        <p:cTn id="13" dur="500" fill="hold"/>
+                                        <p:tgtEl>
+                                          <p:spTgt spid="3">
+                                            <p:txEl>
+                                              <p:pRg st="1" end="1"/>
+                                            </p:txEl>
+                                          </p:spTgt>
+                                        </p:tgtEl>
+                                        <p:attrNameLst>
+                                          <p:attrName>ppt_x</p:attrName>
+                                        </p:attrNameLst>
+                                      </p:cBhvr>
+                                      <p:tavLst>
+                                        <p:tav tm="0">
+                                          <p:val>
+                                            <p:strVal val="#ppt_x"/>
+                                          </p:val>
+                                        </p:tav>
+                                        <p:tav tm="100000">
+                                          <p:val>
+                                            <p:strVal val="#ppt_x"/>
+                                          </p:val>
+                                        </p:tav>
+                                      </p:tavLst>
+                                    </p:anim>
+                                    <p:anim calcmode="lin" valueType="num">
+                                      <p:cBhvr additive="base">
+                                        <p:cTn id="14" dur="500" fill="hold"/>
+                                        <p:tgtEl>
+                                          <p:spTgt spid="3">
+                                            <p:txEl>
+                                              <p:pRg st="1" end="1"/>
+                                            </p:txEl>
+                                          </p:spTgt>
+                                        </p:tgtEl>
+                                        <p:attrNameLst>
+                                          <p:attrName>ppt_y</p:attrName>
+                                        </p:attrNameLst>
+                                      </p:cBhvr>
+                                      <p:tavLst>
+                                        <p:tav tm="0">
+                                          <p:val>
+                                            <p:strVal val="1+#ppt_h/2"/>
+                                          </p:val>
+                                        </p:tav>
+                                        <p:tav tm="100000">
+                                          <p:val>
+                                            <p:strVal val="#ppt_y"/>
+                                          </p:val>
+                                        </p:tav>
+                                      </p:tavLst>
+                                    </p:anim>
+                                  </p:childTnLst>
+                                </p:cTn>
+                              </p:par>
+                            </p:childTnLst>
+                          </p:cTn>
+                        </p:par>
+                      </p:childTnLst>
+                    </p:cTn>
+                  </p:par>
+                </p:childTnLst>
+              </p:cTn>
+              <p:prevCondLst>
+                <p:cond evt="onPrev" delay="0">
+                  <p:tgtEl>
+                    <p:sldTgt/>
+                  </p:tgtEl>
+                </p:cond>
+              </p:prevCondLst>
+              <p:nextCondLst>
+                <p:cond evt="onNext" delay="0">
+                  <p:tgtEl>
+                    <p:sldTgt/>
+                  </p:tgtEl>
+                </p:cond>
+              </p:nextCondLst>
+            </p:seq>
+          </p:childTnLst>
+        </p:cTn>
+      </p:par>
+    </p:tnLst>
+  </p:timing>
 </p:sld>
 </file>
 

</xml_diff>

<commit_message>
updated ppt to include schematics
:fu: :grin:
</commit_message>
<xml_diff>
--- a/embedded C project .pptx
+++ b/embedded C project .pptx
@@ -15,11 +15,12 @@
     <p:sldId id="265" r:id="rId9"/>
     <p:sldId id="268" r:id="rId10"/>
     <p:sldId id="266" r:id="rId11"/>
-    <p:sldId id="261" r:id="rId12"/>
-    <p:sldId id="262" r:id="rId13"/>
-    <p:sldId id="267" r:id="rId14"/>
-    <p:sldId id="258" r:id="rId15"/>
-    <p:sldId id="263" r:id="rId16"/>
+    <p:sldId id="271" r:id="rId12"/>
+    <p:sldId id="261" r:id="rId13"/>
+    <p:sldId id="262" r:id="rId14"/>
+    <p:sldId id="267" r:id="rId15"/>
+    <p:sldId id="258" r:id="rId16"/>
+    <p:sldId id="263" r:id="rId17"/>
   </p:sldIdLst>
   <p:sldSz cx="12192000" cy="6858000"/>
   <p:notesSz cx="6858000" cy="9144000"/>
@@ -356,7 +357,7 @@
             <a:fld id="{B61BEF0D-F0BB-DE4B-95CE-6DB70DBA9567}" type="datetimeFigureOut">
               <a:rPr lang="en-US" dirty="0"/>
               <a:pPr/>
-              <a:t>27-May-18</a:t>
+              <a:t>5/27/2018</a:t>
             </a:fld>
             <a:endParaRPr lang="en-US" dirty="0"/>
           </a:p>
@@ -687,7 +688,7 @@
             <a:fld id="{B61BEF0D-F0BB-DE4B-95CE-6DB70DBA9567}" type="datetimeFigureOut">
               <a:rPr lang="en-US" dirty="0"/>
               <a:pPr/>
-              <a:t>27-May-18</a:t>
+              <a:t>5/27/2018</a:t>
             </a:fld>
             <a:endParaRPr lang="en-US" dirty="0"/>
           </a:p>
@@ -962,7 +963,7 @@
             <a:fld id="{B61BEF0D-F0BB-DE4B-95CE-6DB70DBA9567}" type="datetimeFigureOut">
               <a:rPr lang="en-US" dirty="0"/>
               <a:pPr/>
-              <a:t>27-May-18</a:t>
+              <a:t>5/27/2018</a:t>
             </a:fld>
             <a:endParaRPr lang="en-US" dirty="0"/>
           </a:p>
@@ -1527,7 +1528,7 @@
             <a:fld id="{B61BEF0D-F0BB-DE4B-95CE-6DB70DBA9567}" type="datetimeFigureOut">
               <a:rPr lang="en-US" dirty="0"/>
               <a:pPr/>
-              <a:t>27-May-18</a:t>
+              <a:t>5/27/2018</a:t>
             </a:fld>
             <a:endParaRPr lang="en-US" dirty="0"/>
           </a:p>
@@ -1802,7 +1803,7 @@
             <a:fld id="{B61BEF0D-F0BB-DE4B-95CE-6DB70DBA9567}" type="datetimeFigureOut">
               <a:rPr lang="en-US" dirty="0"/>
               <a:pPr/>
-              <a:t>27-May-18</a:t>
+              <a:t>5/27/2018</a:t>
             </a:fld>
             <a:endParaRPr lang="en-US" dirty="0"/>
           </a:p>
@@ -2361,7 +2362,7 @@
             <a:fld id="{B61BEF0D-F0BB-DE4B-95CE-6DB70DBA9567}" type="datetimeFigureOut">
               <a:rPr lang="en-US" dirty="0"/>
               <a:pPr/>
-              <a:t>27-May-18</a:t>
+              <a:t>5/27/2018</a:t>
             </a:fld>
             <a:endParaRPr lang="en-US" dirty="0"/>
           </a:p>
@@ -2685,7 +2686,7 @@
             <a:fld id="{B61BEF0D-F0BB-DE4B-95CE-6DB70DBA9567}" type="datetimeFigureOut">
               <a:rPr lang="en-US" dirty="0"/>
               <a:pPr/>
-              <a:t>27-May-18</a:t>
+              <a:t>5/27/2018</a:t>
             </a:fld>
             <a:endParaRPr lang="en-US" dirty="0"/>
           </a:p>
@@ -2859,7 +2860,7 @@
             <a:fld id="{B61BEF0D-F0BB-DE4B-95CE-6DB70DBA9567}" type="datetimeFigureOut">
               <a:rPr lang="en-US" dirty="0"/>
               <a:pPr/>
-              <a:t>27-May-18</a:t>
+              <a:t>5/27/2018</a:t>
             </a:fld>
             <a:endParaRPr lang="en-US" dirty="0"/>
           </a:p>
@@ -3094,7 +3095,7 @@
             <a:fld id="{B61BEF0D-F0BB-DE4B-95CE-6DB70DBA9567}" type="datetimeFigureOut">
               <a:rPr lang="en-US" dirty="0"/>
               <a:pPr/>
-              <a:t>27-May-18</a:t>
+              <a:t>5/27/2018</a:t>
             </a:fld>
             <a:endParaRPr lang="en-US" dirty="0"/>
           </a:p>
@@ -3291,7 +3292,7 @@
             <a:fld id="{B61BEF0D-F0BB-DE4B-95CE-6DB70DBA9567}" type="datetimeFigureOut">
               <a:rPr lang="en-US" dirty="0"/>
               <a:pPr/>
-              <a:t>27-May-18</a:t>
+              <a:t>5/27/2018</a:t>
             </a:fld>
             <a:endParaRPr lang="en-US" dirty="0"/>
           </a:p>
@@ -3564,7 +3565,7 @@
             <a:fld id="{B61BEF0D-F0BB-DE4B-95CE-6DB70DBA9567}" type="datetimeFigureOut">
               <a:rPr lang="en-US" dirty="0"/>
               <a:pPr/>
-              <a:t>27-May-18</a:t>
+              <a:t>5/27/2018</a:t>
             </a:fld>
             <a:endParaRPr lang="en-US" dirty="0"/>
           </a:p>
@@ -3827,7 +3828,7 @@
             <a:fld id="{B61BEF0D-F0BB-DE4B-95CE-6DB70DBA9567}" type="datetimeFigureOut">
               <a:rPr lang="en-US" dirty="0"/>
               <a:pPr/>
-              <a:t>27-May-18</a:t>
+              <a:t>5/27/2018</a:t>
             </a:fld>
             <a:endParaRPr lang="en-US" dirty="0"/>
           </a:p>
@@ -4198,7 +4199,7 @@
             <a:fld id="{B61BEF0D-F0BB-DE4B-95CE-6DB70DBA9567}" type="datetimeFigureOut">
               <a:rPr lang="en-US" dirty="0"/>
               <a:pPr/>
-              <a:t>27-May-18</a:t>
+              <a:t>5/27/2018</a:t>
             </a:fld>
             <a:endParaRPr lang="en-US" dirty="0"/>
           </a:p>
@@ -4343,7 +4344,7 @@
             <a:fld id="{B61BEF0D-F0BB-DE4B-95CE-6DB70DBA9567}" type="datetimeFigureOut">
               <a:rPr lang="en-US" dirty="0"/>
               <a:pPr/>
-              <a:t>27-May-18</a:t>
+              <a:t>5/27/2018</a:t>
             </a:fld>
             <a:endParaRPr lang="en-US" dirty="0"/>
           </a:p>
@@ -4465,7 +4466,7 @@
             <a:fld id="{B61BEF0D-F0BB-DE4B-95CE-6DB70DBA9567}" type="datetimeFigureOut">
               <a:rPr lang="en-US" dirty="0"/>
               <a:pPr/>
-              <a:t>27-May-18</a:t>
+              <a:t>5/27/2018</a:t>
             </a:fld>
             <a:endParaRPr lang="en-US" dirty="0"/>
           </a:p>
@@ -4747,7 +4748,7 @@
             <a:fld id="{B61BEF0D-F0BB-DE4B-95CE-6DB70DBA9567}" type="datetimeFigureOut">
               <a:rPr lang="en-US" dirty="0"/>
               <a:pPr/>
-              <a:t>27-May-18</a:t>
+              <a:t>5/27/2018</a:t>
             </a:fld>
             <a:endParaRPr lang="en-US" dirty="0"/>
           </a:p>
@@ -5068,7 +5069,7 @@
             <a:fld id="{B61BEF0D-F0BB-DE4B-95CE-6DB70DBA9567}" type="datetimeFigureOut">
               <a:rPr lang="en-US" dirty="0"/>
               <a:pPr/>
-              <a:t>27-May-18</a:t>
+              <a:t>5/27/2018</a:t>
             </a:fld>
             <a:endParaRPr lang="en-US" dirty="0"/>
           </a:p>
@@ -5279,7 +5280,7 @@
             <a:fld id="{B61BEF0D-F0BB-DE4B-95CE-6DB70DBA9567}" type="datetimeFigureOut">
               <a:rPr lang="en-US" dirty="0"/>
               <a:pPr/>
-              <a:t>27-May-18</a:t>
+              <a:t>5/27/2018</a:t>
             </a:fld>
             <a:endParaRPr lang="en-US" dirty="0"/>
           </a:p>
@@ -5920,34 +5921,35 @@
           </a:p>
         </p:txBody>
       </p:sp>
-      <p:sp>
-        <p:nvSpPr>
-          <p:cNvPr id="3" name="Content Placeholder 2">
+      <p:pic>
+        <p:nvPicPr>
+          <p:cNvPr id="5" name="Content Placeholder 4" descr="A close up of a map&#10;&#10;Description generated with very high confidence">
             <a:extLst>
               <a:ext uri="{FF2B5EF4-FFF2-40B4-BE49-F238E27FC236}">
-                <a16:creationId xmlns:a16="http://schemas.microsoft.com/office/drawing/2014/main" id="{E32DABB6-B9BD-46E6-8FF6-CAF4F177E0AA}"/>
+                <a16:creationId xmlns:a16="http://schemas.microsoft.com/office/drawing/2014/main" id="{C16531D7-A1E2-43DD-90B8-8A39044DCFF7}"/>
               </a:ext>
             </a:extLst>
           </p:cNvPr>
-          <p:cNvSpPr>
-            <a:spLocks noGrp="1"/>
-          </p:cNvSpPr>
+          <p:cNvPicPr>
+            <a:picLocks noGrp="1" noChangeAspect="1"/>
+          </p:cNvPicPr>
           <p:nvPr>
             <p:ph idx="1"/>
           </p:nvPr>
-        </p:nvSpPr>
-        <p:spPr/>
-        <p:txBody>
-          <a:bodyPr/>
-          <a:lstStyle/>
-          <a:p>
-            <a:r>
-              <a:rPr lang="en-US" dirty="0"/>
-              <a:t>Will upload pic </a:t>
-            </a:r>
-          </a:p>
-        </p:txBody>
-      </p:sp>
+        </p:nvPicPr>
+        <p:blipFill>
+          <a:blip r:embed="rId2"/>
+          <a:stretch>
+            <a:fillRect/>
+          </a:stretch>
+        </p:blipFill>
+        <p:spPr>
+          <a:xfrm>
+            <a:off x="914401" y="1970087"/>
+            <a:ext cx="10131424" cy="4621213"/>
+          </a:xfrm>
+        </p:spPr>
+      </p:pic>
     </p:spTree>
     <p:extLst>
       <p:ext uri="{BB962C8B-B14F-4D97-AF65-F5344CB8AC3E}">
@@ -5958,18 +5960,9 @@
   <p:clrMapOvr>
     <a:masterClrMapping/>
   </p:clrMapOvr>
-  <mc:AlternateContent xmlns:mc="http://schemas.openxmlformats.org/markup-compatibility/2006" xmlns:p15="http://schemas.microsoft.com/office/powerpoint/2012/main">
-    <mc:Choice Requires="p15">
-      <p:transition xmlns:p14="http://schemas.microsoft.com/office/powerpoint/2010/main" spd="slow" p14:dur="3250">
-        <p15:prstTrans prst="origami"/>
-      </p:transition>
-    </mc:Choice>
-    <mc:Fallback xmlns="">
-      <p:transition spd="slow">
-        <p:fade/>
-      </p:transition>
-    </mc:Fallback>
-  </mc:AlternateContent>
+  <p:transition spd="slow">
+    <p:push dir="u"/>
+  </p:transition>
 </p:sld>
 </file>
 
@@ -5995,7 +5988,7 @@
           <p:cNvPr id="2" name="Title 1">
             <a:extLst>
               <a:ext uri="{FF2B5EF4-FFF2-40B4-BE49-F238E27FC236}">
-                <a16:creationId xmlns:a16="http://schemas.microsoft.com/office/drawing/2014/main" id="{F4091B77-3050-4CD5-9CB0-091C190E7B1B}"/>
+                <a16:creationId xmlns:a16="http://schemas.microsoft.com/office/drawing/2014/main" id="{1B6982FC-AF4A-46AB-97D6-672DAE12DD1E}"/>
               </a:ext>
             </a:extLst>
           </p:cNvPr>
@@ -6012,8 +6005,12 @@
           <a:lstStyle/>
           <a:p>
             <a:r>
+              <a:rPr lang="en-US" dirty="0" err="1"/>
+              <a:t>atmega</a:t>
+            </a:r>
+            <a:r>
               <a:rPr lang="en-US" dirty="0"/>
-              <a:t>Frequency determination </a:t>
+              <a:t> 328p specs </a:t>
             </a:r>
           </a:p>
         </p:txBody>
@@ -6023,7 +6020,7 @@
           <p:cNvPr id="3" name="Content Placeholder 2">
             <a:extLst>
               <a:ext uri="{FF2B5EF4-FFF2-40B4-BE49-F238E27FC236}">
-                <a16:creationId xmlns:a16="http://schemas.microsoft.com/office/drawing/2014/main" id="{D2D76396-8595-4CA1-88CD-AE56111DE7BA}"/>
+                <a16:creationId xmlns:a16="http://schemas.microsoft.com/office/drawing/2014/main" id="{EEB2638D-5667-412B-827D-C6B138AF5B48}"/>
               </a:ext>
             </a:extLst>
           </p:cNvPr>
@@ -6041,7 +6038,19 @@
           <a:p>
             <a:r>
               <a:rPr lang="en-US" dirty="0"/>
-              <a:t>Drew to explain </a:t>
+              <a:t>28-pin AVR Microcontroller</a:t>
+            </a:r>
+          </a:p>
+          <a:p>
+            <a:r>
+              <a:rPr lang="en-US" dirty="0"/>
+              <a:t>I/O Pins: 23</a:t>
+            </a:r>
+          </a:p>
+          <a:p>
+            <a:r>
+              <a:rPr lang="en-US" dirty="0"/>
+              <a:t>Timers: Two 8-bit / One 16-bit</a:t>
             </a:r>
           </a:p>
         </p:txBody>
@@ -6049,25 +6058,16 @@
     </p:spTree>
     <p:extLst>
       <p:ext uri="{BB962C8B-B14F-4D97-AF65-F5344CB8AC3E}">
-        <p14:creationId xmlns:p14="http://schemas.microsoft.com/office/powerpoint/2010/main" val="1152952955"/>
+        <p14:creationId xmlns:p14="http://schemas.microsoft.com/office/powerpoint/2010/main" val="1414180979"/>
       </p:ext>
     </p:extLst>
   </p:cSld>
   <p:clrMapOvr>
     <a:masterClrMapping/>
   </p:clrMapOvr>
-  <mc:AlternateContent xmlns:mc="http://schemas.openxmlformats.org/markup-compatibility/2006" xmlns:p14="http://schemas.microsoft.com/office/powerpoint/2010/main">
-    <mc:Choice Requires="p14">
-      <p:transition spd="slow" p14:dur="2500">
-        <p:checker/>
-      </p:transition>
-    </mc:Choice>
-    <mc:Fallback xmlns="">
-      <p:transition spd="slow">
-        <p:checker/>
-      </p:transition>
-    </mc:Fallback>
-  </mc:AlternateContent>
+  <p:transition spd="slow">
+    <p:wipe/>
+  </p:transition>
 </p:sld>
 </file>
 
@@ -6093,6 +6093,104 @@
           <p:cNvPr id="2" name="Title 1">
             <a:extLst>
               <a:ext uri="{FF2B5EF4-FFF2-40B4-BE49-F238E27FC236}">
+                <a16:creationId xmlns:a16="http://schemas.microsoft.com/office/drawing/2014/main" id="{F4091B77-3050-4CD5-9CB0-091C190E7B1B}"/>
+              </a:ext>
+            </a:extLst>
+          </p:cNvPr>
+          <p:cNvSpPr>
+            <a:spLocks noGrp="1"/>
+          </p:cNvSpPr>
+          <p:nvPr>
+            <p:ph type="title"/>
+          </p:nvPr>
+        </p:nvSpPr>
+        <p:spPr/>
+        <p:txBody>
+          <a:bodyPr/>
+          <a:lstStyle/>
+          <a:p>
+            <a:r>
+              <a:rPr lang="en-US" dirty="0"/>
+              <a:t>Frequency determination </a:t>
+            </a:r>
+          </a:p>
+        </p:txBody>
+      </p:sp>
+      <p:sp>
+        <p:nvSpPr>
+          <p:cNvPr id="3" name="Content Placeholder 2">
+            <a:extLst>
+              <a:ext uri="{FF2B5EF4-FFF2-40B4-BE49-F238E27FC236}">
+                <a16:creationId xmlns:a16="http://schemas.microsoft.com/office/drawing/2014/main" id="{D2D76396-8595-4CA1-88CD-AE56111DE7BA}"/>
+              </a:ext>
+            </a:extLst>
+          </p:cNvPr>
+          <p:cNvSpPr>
+            <a:spLocks noGrp="1"/>
+          </p:cNvSpPr>
+          <p:nvPr>
+            <p:ph idx="1"/>
+          </p:nvPr>
+        </p:nvSpPr>
+        <p:spPr/>
+        <p:txBody>
+          <a:bodyPr/>
+          <a:lstStyle/>
+          <a:p>
+            <a:r>
+              <a:rPr lang="en-US" dirty="0"/>
+              <a:t>Drew to explain </a:t>
+            </a:r>
+          </a:p>
+        </p:txBody>
+      </p:sp>
+    </p:spTree>
+    <p:extLst>
+      <p:ext uri="{BB962C8B-B14F-4D97-AF65-F5344CB8AC3E}">
+        <p14:creationId xmlns:p14="http://schemas.microsoft.com/office/powerpoint/2010/main" val="1152952955"/>
+      </p:ext>
+    </p:extLst>
+  </p:cSld>
+  <p:clrMapOvr>
+    <a:masterClrMapping/>
+  </p:clrMapOvr>
+  <mc:AlternateContent xmlns:mc="http://schemas.openxmlformats.org/markup-compatibility/2006">
+    <mc:Choice xmlns:p14="http://schemas.microsoft.com/office/powerpoint/2010/main" Requires="p14">
+      <p:transition spd="slow" p14:dur="3400">
+        <p14:reveal/>
+      </p:transition>
+    </mc:Choice>
+    <mc:Fallback>
+      <p:transition spd="slow">
+        <p:fade/>
+      </p:transition>
+    </mc:Fallback>
+  </mc:AlternateContent>
+</p:sld>
+</file>
+
+<file path=ppt/slides/slide13.xml><?xml version="1.0" encoding="utf-8"?>
+<p:sld xmlns:a="http://schemas.openxmlformats.org/drawingml/2006/main" xmlns:r="http://schemas.openxmlformats.org/officeDocument/2006/relationships" xmlns:p="http://schemas.openxmlformats.org/presentationml/2006/main">
+  <p:cSld>
+    <p:spTree>
+      <p:nvGrpSpPr>
+        <p:cNvPr id="1" name=""/>
+        <p:cNvGrpSpPr/>
+        <p:nvPr/>
+      </p:nvGrpSpPr>
+      <p:grpSpPr>
+        <a:xfrm>
+          <a:off x="0" y="0"/>
+          <a:ext cx="0" cy="0"/>
+          <a:chOff x="0" y="0"/>
+          <a:chExt cx="0" cy="0"/>
+        </a:xfrm>
+      </p:grpSpPr>
+      <p:sp>
+        <p:nvSpPr>
+          <p:cNvPr id="2" name="Title 1">
+            <a:extLst>
+              <a:ext uri="{FF2B5EF4-FFF2-40B4-BE49-F238E27FC236}">
                 <a16:creationId xmlns:a16="http://schemas.microsoft.com/office/drawing/2014/main" id="{A58B5A4A-4E11-4780-A6C3-2D57CB2B7FE1}"/>
               </a:ext>
             </a:extLst>
@@ -6184,13 +6282,13 @@
   <p:clrMapOvr>
     <a:masterClrMapping/>
   </p:clrMapOvr>
-  <mc:AlternateContent xmlns:mc="http://schemas.openxmlformats.org/markup-compatibility/2006" xmlns:p14="http://schemas.microsoft.com/office/powerpoint/2010/main">
-    <mc:Choice Requires="p14">
-      <p:transition spd="slow" p14:dur="800">
-        <p14:flythrough/>
+  <mc:AlternateContent xmlns:mc="http://schemas.openxmlformats.org/markup-compatibility/2006">
+    <mc:Choice xmlns:p14="http://schemas.microsoft.com/office/powerpoint/2010/main" Requires="p14">
+      <p:transition spd="slow">
+        <p14:flash/>
       </p:transition>
     </mc:Choice>
-    <mc:Fallback xmlns="">
+    <mc:Fallback>
       <p:transition spd="slow">
         <p:fade/>
       </p:transition>
@@ -6757,7 +6855,7 @@
 </p:sld>
 </file>
 
-<file path=ppt/slides/slide13.xml><?xml version="1.0" encoding="utf-8"?>
+<file path=ppt/slides/slide14.xml><?xml version="1.0" encoding="utf-8"?>
 <p:sld xmlns:a="http://schemas.openxmlformats.org/drawingml/2006/main" xmlns:r="http://schemas.openxmlformats.org/officeDocument/2006/relationships" xmlns:p="http://schemas.openxmlformats.org/presentationml/2006/main">
   <p:cSld>
     <p:spTree>
@@ -6846,18 +6944,9 @@
   <p:clrMapOvr>
     <a:masterClrMapping/>
   </p:clrMapOvr>
-  <mc:AlternateContent xmlns:mc="http://schemas.openxmlformats.org/markup-compatibility/2006" xmlns:p14="http://schemas.microsoft.com/office/powerpoint/2010/main">
-    <mc:Choice Requires="p14">
-      <p:transition spd="slow" p14:dur="1600">
-        <p14:prism isContent="1" isInverted="1"/>
-      </p:transition>
-    </mc:Choice>
-    <mc:Fallback xmlns="">
-      <p:transition spd="slow">
-        <p:fade/>
-      </p:transition>
-    </mc:Fallback>
-  </mc:AlternateContent>
+  <p:transition spd="slow">
+    <p:push dir="u"/>
+  </p:transition>
   <p:timing>
     <p:tnLst>
       <p:par>
@@ -7097,99 +7186,6 @@
 </p:sld>
 </file>
 
-<file path=ppt/slides/slide14.xml><?xml version="1.0" encoding="utf-8"?>
-<p:sld xmlns:a="http://schemas.openxmlformats.org/drawingml/2006/main" xmlns:r="http://schemas.openxmlformats.org/officeDocument/2006/relationships" xmlns:p="http://schemas.openxmlformats.org/presentationml/2006/main">
-  <p:cSld>
-    <p:spTree>
-      <p:nvGrpSpPr>
-        <p:cNvPr id="1" name=""/>
-        <p:cNvGrpSpPr/>
-        <p:nvPr/>
-      </p:nvGrpSpPr>
-      <p:grpSpPr>
-        <a:xfrm>
-          <a:off x="0" y="0"/>
-          <a:ext cx="0" cy="0"/>
-          <a:chOff x="0" y="0"/>
-          <a:chExt cx="0" cy="0"/>
-        </a:xfrm>
-      </p:grpSpPr>
-      <p:sp>
-        <p:nvSpPr>
-          <p:cNvPr id="2" name="Title 1">
-            <a:extLst>
-              <a:ext uri="{FF2B5EF4-FFF2-40B4-BE49-F238E27FC236}">
-                <a16:creationId xmlns:a16="http://schemas.microsoft.com/office/drawing/2014/main" id="{0BB23F91-E335-43F5-9EA3-176ED7C70901}"/>
-              </a:ext>
-            </a:extLst>
-          </p:cNvPr>
-          <p:cNvSpPr>
-            <a:spLocks noGrp="1"/>
-          </p:cNvSpPr>
-          <p:nvPr>
-            <p:ph type="title"/>
-          </p:nvPr>
-        </p:nvSpPr>
-        <p:spPr>
-          <a:xfrm>
-            <a:off x="685801" y="609600"/>
-            <a:ext cx="10131425" cy="1456267"/>
-          </a:xfrm>
-        </p:spPr>
-        <p:txBody>
-          <a:bodyPr/>
-          <a:lstStyle/>
-          <a:p>
-            <a:pPr algn="ctr"/>
-            <a:r>
-              <a:rPr lang="en-US" b="1" dirty="0"/>
-              <a:t>DEMO </a:t>
-            </a:r>
-          </a:p>
-        </p:txBody>
-      </p:sp>
-      <p:pic>
-        <p:nvPicPr>
-          <p:cNvPr id="5" name="Content Placeholder 4" descr="A picture containing indoor, table, sitting, wall&#10;&#10;Description generated with very high confidence">
-            <a:extLst>
-              <a:ext uri="{FF2B5EF4-FFF2-40B4-BE49-F238E27FC236}">
-                <a16:creationId xmlns:a16="http://schemas.microsoft.com/office/drawing/2014/main" id="{D6E529A7-4D65-405F-B562-BD70D9049827}"/>
-              </a:ext>
-            </a:extLst>
-          </p:cNvPr>
-          <p:cNvPicPr>
-            <a:picLocks noGrp="1" noChangeAspect="1"/>
-          </p:cNvPicPr>
-          <p:nvPr>
-            <p:ph idx="1"/>
-          </p:nvPr>
-        </p:nvPicPr>
-        <p:blipFill>
-          <a:blip r:embed="rId2"/>
-          <a:stretch>
-            <a:fillRect/>
-          </a:stretch>
-        </p:blipFill>
-        <p:spPr>
-          <a:xfrm>
-            <a:off x="2507368" y="2141538"/>
-            <a:ext cx="6488288" cy="3649662"/>
-          </a:xfrm>
-        </p:spPr>
-      </p:pic>
-    </p:spTree>
-    <p:extLst>
-      <p:ext uri="{BB962C8B-B14F-4D97-AF65-F5344CB8AC3E}">
-        <p14:creationId xmlns:p14="http://schemas.microsoft.com/office/powerpoint/2010/main" val="2573624688"/>
-      </p:ext>
-    </p:extLst>
-  </p:cSld>
-  <p:clrMapOvr>
-    <a:masterClrMapping/>
-  </p:clrMapOvr>
-</p:sld>
-</file>
-
 <file path=ppt/slides/slide15.xml><?xml version="1.0" encoding="utf-8"?>
 <p:sld xmlns:a="http://schemas.openxmlformats.org/drawingml/2006/main" xmlns:r="http://schemas.openxmlformats.org/officeDocument/2006/relationships" xmlns:p="http://schemas.openxmlformats.org/presentationml/2006/main">
   <p:cSld>
@@ -7212,6 +7208,73 @@
           <p:cNvPr id="2" name="Title 1">
             <a:extLst>
               <a:ext uri="{FF2B5EF4-FFF2-40B4-BE49-F238E27FC236}">
+                <a16:creationId xmlns:a16="http://schemas.microsoft.com/office/drawing/2014/main" id="{0BB23F91-E335-43F5-9EA3-176ED7C70901}"/>
+              </a:ext>
+            </a:extLst>
+          </p:cNvPr>
+          <p:cNvSpPr>
+            <a:spLocks noGrp="1"/>
+          </p:cNvSpPr>
+          <p:nvPr>
+            <p:ph type="title"/>
+          </p:nvPr>
+        </p:nvSpPr>
+        <p:spPr>
+          <a:xfrm>
+            <a:off x="685802" y="609600"/>
+            <a:ext cx="10048874" cy="4133850"/>
+          </a:xfrm>
+        </p:spPr>
+        <p:txBody>
+          <a:bodyPr/>
+          <a:lstStyle/>
+          <a:p>
+            <a:pPr algn="ctr"/>
+            <a:r>
+              <a:rPr lang="en-US" b="1" dirty="0"/>
+              <a:t>DEMO </a:t>
+            </a:r>
+          </a:p>
+        </p:txBody>
+      </p:sp>
+    </p:spTree>
+    <p:extLst>
+      <p:ext uri="{BB962C8B-B14F-4D97-AF65-F5344CB8AC3E}">
+        <p14:creationId xmlns:p14="http://schemas.microsoft.com/office/powerpoint/2010/main" val="2573624688"/>
+      </p:ext>
+    </p:extLst>
+  </p:cSld>
+  <p:clrMapOvr>
+    <a:masterClrMapping/>
+  </p:clrMapOvr>
+  <p:transition spd="slow">
+    <p:wipe/>
+  </p:transition>
+</p:sld>
+</file>
+
+<file path=ppt/slides/slide16.xml><?xml version="1.0" encoding="utf-8"?>
+<p:sld xmlns:a="http://schemas.openxmlformats.org/drawingml/2006/main" xmlns:r="http://schemas.openxmlformats.org/officeDocument/2006/relationships" xmlns:p="http://schemas.openxmlformats.org/presentationml/2006/main">
+  <p:cSld>
+    <p:spTree>
+      <p:nvGrpSpPr>
+        <p:cNvPr id="1" name=""/>
+        <p:cNvGrpSpPr/>
+        <p:nvPr/>
+      </p:nvGrpSpPr>
+      <p:grpSpPr>
+        <a:xfrm>
+          <a:off x="0" y="0"/>
+          <a:ext cx="0" cy="0"/>
+          <a:chOff x="0" y="0"/>
+          <a:chExt cx="0" cy="0"/>
+        </a:xfrm>
+      </p:grpSpPr>
+      <p:sp>
+        <p:nvSpPr>
+          <p:cNvPr id="2" name="Title 1">
+            <a:extLst>
+              <a:ext uri="{FF2B5EF4-FFF2-40B4-BE49-F238E27FC236}">
                 <a16:creationId xmlns:a16="http://schemas.microsoft.com/office/drawing/2014/main" id="{0211EABF-91A9-4678-860F-6CA75B2CA051}"/>
               </a:ext>
             </a:extLst>
@@ -7225,8 +7288,8 @@
         </p:nvSpPr>
         <p:spPr>
           <a:xfrm>
-            <a:off x="685801" y="609600"/>
-            <a:ext cx="10131425" cy="4217377"/>
+            <a:off x="685801" y="609601"/>
+            <a:ext cx="10258424" cy="2076450"/>
           </a:xfrm>
         </p:spPr>
         <p:txBody>
@@ -7238,9 +7301,42 @@
               <a:rPr lang="en-US" dirty="0"/>
               <a:t>Questions? </a:t>
             </a:r>
-          </a:p>
-        </p:txBody>
-      </p:sp>
+            <a:br>
+              <a:rPr lang="en-US" dirty="0"/>
+            </a:br>
+            <a:endParaRPr lang="en-US" dirty="0"/>
+          </a:p>
+        </p:txBody>
+      </p:sp>
+      <p:pic>
+        <p:nvPicPr>
+          <p:cNvPr id="3" name="Content Placeholder 4" descr="A picture containing indoor, table, sitting, wall&#10;&#10;Description generated with very high confidence">
+            <a:extLst>
+              <a:ext uri="{FF2B5EF4-FFF2-40B4-BE49-F238E27FC236}">
+                <a16:creationId xmlns:a16="http://schemas.microsoft.com/office/drawing/2014/main" id="{5D5149CA-E08E-4EC4-AC32-0B520D7D7E3C}"/>
+              </a:ext>
+            </a:extLst>
+          </p:cNvPr>
+          <p:cNvPicPr>
+            <a:picLocks noGrp="1" noChangeAspect="1"/>
+          </p:cNvPicPr>
+          <p:nvPr>
+            <p:ph idx="1"/>
+          </p:nvPr>
+        </p:nvPicPr>
+        <p:blipFill>
+          <a:blip r:embed="rId2"/>
+          <a:stretch>
+            <a:fillRect/>
+          </a:stretch>
+        </p:blipFill>
+        <p:spPr>
+          <a:xfrm>
+            <a:off x="2640718" y="2274888"/>
+            <a:ext cx="6488288" cy="3649662"/>
+          </a:xfrm>
+        </p:spPr>
+      </p:pic>
     </p:spTree>
     <p:extLst>
       <p:ext uri="{BB962C8B-B14F-4D97-AF65-F5344CB8AC3E}">
@@ -7251,13 +7347,13 @@
   <p:clrMapOvr>
     <a:masterClrMapping/>
   </p:clrMapOvr>
-  <mc:AlternateContent xmlns:mc="http://schemas.openxmlformats.org/markup-compatibility/2006" xmlns:p15="http://schemas.microsoft.com/office/powerpoint/2012/main">
-    <mc:Choice Requires="p15">
-      <p:transition xmlns:p14="http://schemas.microsoft.com/office/powerpoint/2010/main" spd="slow" p14:dur="1250">
-        <p15:prstTrans prst="pageCurlDouble"/>
+  <mc:AlternateContent xmlns:mc="http://schemas.openxmlformats.org/markup-compatibility/2006">
+    <mc:Choice xmlns:p14="http://schemas.microsoft.com/office/powerpoint/2010/main" Requires="p14">
+      <p:transition spd="slow" p14:dur="3400">
+        <p14:reveal/>
       </p:transition>
     </mc:Choice>
-    <mc:Fallback xmlns="">
+    <mc:Fallback>
       <p:transition spd="slow">
         <p:fade/>
       </p:transition>
@@ -7549,17 +7645,17 @@
           <a:p>
             <a:r>
               <a:rPr lang="en-US" dirty="0"/>
-              <a:t>SCHEMATIC for the screen </a:t>
+              <a:t>SCHEMATIC for OLED</a:t>
             </a:r>
           </a:p>
         </p:txBody>
       </p:sp>
       <p:pic>
         <p:nvPicPr>
-          <p:cNvPr id="4" name="Content Placeholder 3">
+          <p:cNvPr id="7" name="Content Placeholder 6" descr="A close up of a map&#10;&#10;Description generated with very high confidence">
             <a:extLst>
               <a:ext uri="{FF2B5EF4-FFF2-40B4-BE49-F238E27FC236}">
-                <a16:creationId xmlns:a16="http://schemas.microsoft.com/office/drawing/2014/main" id="{CAAA9CEF-1A3C-4095-B322-42891377FE7B}"/>
+                <a16:creationId xmlns:a16="http://schemas.microsoft.com/office/drawing/2014/main" id="{8E331432-02D2-4B83-B30D-534759103EDF}"/>
               </a:ext>
             </a:extLst>
           </p:cNvPr>
@@ -7578,8 +7674,8 @@
         </p:blipFill>
         <p:spPr>
           <a:xfrm>
-            <a:off x="1977386" y="1690316"/>
-            <a:ext cx="6889523" cy="4749089"/>
+            <a:off x="685801" y="2141537"/>
+            <a:ext cx="9279362" cy="4018669"/>
           </a:xfrm>
         </p:spPr>
       </p:pic>
@@ -7766,37 +7862,35 @@
           </a:p>
         </p:txBody>
       </p:sp>
-      <p:sp>
-        <p:nvSpPr>
-          <p:cNvPr id="3" name="Content Placeholder 2">
+      <p:pic>
+        <p:nvPicPr>
+          <p:cNvPr id="5" name="Content Placeholder 4" descr="A close up of a map&#10;&#10;Description generated with high confidence">
             <a:extLst>
               <a:ext uri="{FF2B5EF4-FFF2-40B4-BE49-F238E27FC236}">
-                <a16:creationId xmlns:a16="http://schemas.microsoft.com/office/drawing/2014/main" id="{A88CF914-4450-4243-AFAB-6DB68F0F33C8}"/>
+                <a16:creationId xmlns:a16="http://schemas.microsoft.com/office/drawing/2014/main" id="{8564090F-8957-42A7-95FD-81B1450FF810}"/>
               </a:ext>
             </a:extLst>
           </p:cNvPr>
-          <p:cNvSpPr>
-            <a:spLocks noGrp="1"/>
-          </p:cNvSpPr>
+          <p:cNvPicPr>
+            <a:picLocks noGrp="1" noChangeAspect="1"/>
+          </p:cNvPicPr>
           <p:nvPr>
             <p:ph idx="1"/>
           </p:nvPr>
-        </p:nvSpPr>
-        <p:spPr/>
-        <p:txBody>
-          <a:bodyPr/>
-          <a:lstStyle/>
-          <a:p>
-            <a:r>
-              <a:rPr lang="en-US" dirty="0"/>
-              <a:t>Will upload pic </a:t>
-            </a:r>
-          </a:p>
-          <a:p>
-            <a:endParaRPr lang="en-US" dirty="0"/>
-          </a:p>
-        </p:txBody>
-      </p:sp>
+        </p:nvPicPr>
+        <p:blipFill>
+          <a:blip r:embed="rId2"/>
+          <a:stretch>
+            <a:fillRect/>
+          </a:stretch>
+        </p:blipFill>
+        <p:spPr>
+          <a:xfrm>
+            <a:off x="800100" y="2141538"/>
+            <a:ext cx="8118576" cy="4478337"/>
+          </a:xfrm>
+        </p:spPr>
+      </p:pic>
     </p:spTree>
     <p:extLst>
       <p:ext uri="{BB962C8B-B14F-4D97-AF65-F5344CB8AC3E}">
@@ -7807,18 +7901,9 @@
   <p:clrMapOvr>
     <a:masterClrMapping/>
   </p:clrMapOvr>
-  <mc:AlternateContent xmlns:mc="http://schemas.openxmlformats.org/markup-compatibility/2006" xmlns:p15="http://schemas.microsoft.com/office/powerpoint/2012/main">
-    <mc:Choice Requires="p15">
-      <p:transition xmlns:p14="http://schemas.microsoft.com/office/powerpoint/2010/main" spd="slow" p14:dur="2000">
-        <p15:prstTrans prst="crush"/>
-      </p:transition>
-    </mc:Choice>
-    <mc:Fallback xmlns="">
-      <p:transition spd="slow">
-        <p:fade/>
-      </p:transition>
-    </mc:Fallback>
-  </mc:AlternateContent>
+  <p:transition spd="slow">
+    <p:push dir="u"/>
+  </p:transition>
 </p:sld>
 </file>
 
@@ -8009,18 +8094,9 @@
   <p:clrMapOvr>
     <a:masterClrMapping/>
   </p:clrMapOvr>
-  <mc:AlternateContent xmlns:mc="http://schemas.openxmlformats.org/markup-compatibility/2006" xmlns:p14="http://schemas.microsoft.com/office/powerpoint/2010/main">
-    <mc:Choice Requires="p14">
-      <p:transition spd="slow" p14:dur="4400">
-        <p14:honeycomb/>
-      </p:transition>
-    </mc:Choice>
-    <mc:Fallback xmlns="">
-      <p:transition spd="slow">
-        <p:fade/>
-      </p:transition>
-    </mc:Fallback>
-  </mc:AlternateContent>
+  <p:transition spd="slow">
+    <p:wipe/>
+  </p:transition>
   <p:timing>
     <p:tnLst>
       <p:par>
@@ -8372,34 +8448,35 @@
           </a:p>
         </p:txBody>
       </p:sp>
-      <p:sp>
-        <p:nvSpPr>
-          <p:cNvPr id="3" name="Content Placeholder 2">
+      <p:pic>
+        <p:nvPicPr>
+          <p:cNvPr id="5" name="Content Placeholder 4" descr="A close up of a map&#10;&#10;Description generated with very high confidence">
             <a:extLst>
               <a:ext uri="{FF2B5EF4-FFF2-40B4-BE49-F238E27FC236}">
-                <a16:creationId xmlns:a16="http://schemas.microsoft.com/office/drawing/2014/main" id="{AE75684C-7974-4C18-BEFA-D28D71FC23ED}"/>
+                <a16:creationId xmlns:a16="http://schemas.microsoft.com/office/drawing/2014/main" id="{50C126F0-3036-40D4-BE87-2CD1A02742D5}"/>
               </a:ext>
             </a:extLst>
           </p:cNvPr>
-          <p:cNvSpPr>
-            <a:spLocks noGrp="1"/>
-          </p:cNvSpPr>
+          <p:cNvPicPr>
+            <a:picLocks noGrp="1" noChangeAspect="1"/>
+          </p:cNvPicPr>
           <p:nvPr>
             <p:ph idx="1"/>
           </p:nvPr>
-        </p:nvSpPr>
-        <p:spPr/>
-        <p:txBody>
-          <a:bodyPr/>
-          <a:lstStyle/>
-          <a:p>
-            <a:endParaRPr lang="en-US" dirty="0"/>
-          </a:p>
-          <a:p>
-            <a:endParaRPr lang="en-US" dirty="0"/>
-          </a:p>
-        </p:txBody>
-      </p:sp>
+        </p:nvPicPr>
+        <p:blipFill>
+          <a:blip r:embed="rId2"/>
+          <a:stretch>
+            <a:fillRect/>
+          </a:stretch>
+        </p:blipFill>
+        <p:spPr>
+          <a:xfrm>
+            <a:off x="990600" y="2141538"/>
+            <a:ext cx="8710127" cy="4024726"/>
+          </a:xfrm>
+        </p:spPr>
+      </p:pic>
     </p:spTree>
     <p:extLst>
       <p:ext uri="{BB962C8B-B14F-4D97-AF65-F5344CB8AC3E}">
@@ -8410,13 +8487,13 @@
   <p:clrMapOvr>
     <a:masterClrMapping/>
   </p:clrMapOvr>
-  <mc:AlternateContent xmlns:mc="http://schemas.openxmlformats.org/markup-compatibility/2006" xmlns:p15="http://schemas.microsoft.com/office/powerpoint/2012/main">
-    <mc:Choice Requires="p15">
-      <p:transition xmlns:p14="http://schemas.microsoft.com/office/powerpoint/2010/main" spd="slow" p14:dur="2000">
-        <p15:prstTrans prst="fracture"/>
+  <mc:AlternateContent xmlns:mc="http://schemas.openxmlformats.org/markup-compatibility/2006">
+    <mc:Choice xmlns:p14="http://schemas.microsoft.com/office/powerpoint/2010/main" Requires="p14">
+      <p:transition spd="slow" p14:dur="3400">
+        <p14:reveal/>
       </p:transition>
     </mc:Choice>
-    <mc:Fallback xmlns="">
+    <mc:Fallback>
       <p:transition spd="slow">
         <p:fade/>
       </p:transition>
@@ -8520,13 +8597,13 @@
   <p:clrMapOvr>
     <a:masterClrMapping/>
   </p:clrMapOvr>
-  <mc:AlternateContent xmlns:mc="http://schemas.openxmlformats.org/markup-compatibility/2006" xmlns:p159="http://schemas.microsoft.com/office/powerpoint/2015/09/main">
-    <mc:Choice Requires="p159">
-      <p:transition xmlns:p14="http://schemas.microsoft.com/office/powerpoint/2010/main" spd="slow" p14:dur="2000">
-        <p159:morph option="byObject"/>
+  <mc:AlternateContent xmlns:mc="http://schemas.openxmlformats.org/markup-compatibility/2006">
+    <mc:Choice xmlns:p14="http://schemas.microsoft.com/office/powerpoint/2010/main" Requires="p14">
+      <p:transition spd="slow">
+        <p14:flash/>
       </p:transition>
     </mc:Choice>
-    <mc:Fallback xmlns="">
+    <mc:Fallback>
       <p:transition spd="slow">
         <p:fade/>
       </p:transition>

</xml_diff>